<commit_message>
adding trust and openconfig
</commit_message>
<xml_diff>
--- a/sdn/figures.pptx
+++ b/sdn/figures.pptx
@@ -4,9 +4,14 @@
   <p:sldMasterIdLst>
     <p:sldMasterId id="2147483648" r:id="rId1"/>
   </p:sldMasterIdLst>
+  <p:notesMasterIdLst>
+    <p:notesMasterId r:id="rId6"/>
+  </p:notesMasterIdLst>
   <p:sldIdLst>
     <p:sldId id="259" r:id="rId2"/>
     <p:sldId id="260" r:id="rId3"/>
+    <p:sldId id="261" r:id="rId4"/>
+    <p:sldId id="262" r:id="rId5"/>
   </p:sldIdLst>
   <p:sldSz cx="12192000" cy="6858000"/>
   <p:notesSz cx="6858000" cy="9144000"/>
@@ -113,6 +118,440 @@
 </p:presentation>
 </file>
 
+<file path=ppt/notesMasters/notesMaster1.xml><?xml version="1.0" encoding="utf-8"?>
+<p:notesMaster xmlns:a="http://schemas.openxmlformats.org/drawingml/2006/main" xmlns:r="http://schemas.openxmlformats.org/officeDocument/2006/relationships" xmlns:p="http://schemas.openxmlformats.org/presentationml/2006/main">
+  <p:cSld>
+    <p:bg>
+      <p:bgRef idx="1001">
+        <a:schemeClr val="bg1"/>
+      </p:bgRef>
+    </p:bg>
+    <p:spTree>
+      <p:nvGrpSpPr>
+        <p:cNvPr id="1" name=""/>
+        <p:cNvGrpSpPr/>
+        <p:nvPr/>
+      </p:nvGrpSpPr>
+      <p:grpSpPr>
+        <a:xfrm>
+          <a:off x="0" y="0"/>
+          <a:ext cx="0" cy="0"/>
+          <a:chOff x="0" y="0"/>
+          <a:chExt cx="0" cy="0"/>
+        </a:xfrm>
+      </p:grpSpPr>
+      <p:sp>
+        <p:nvSpPr>
+          <p:cNvPr id="2" name="Header Placeholder 1"/>
+          <p:cNvSpPr>
+            <a:spLocks noGrp="1"/>
+          </p:cNvSpPr>
+          <p:nvPr>
+            <p:ph type="hdr" sz="quarter"/>
+          </p:nvPr>
+        </p:nvSpPr>
+        <p:spPr>
+          <a:xfrm>
+            <a:off x="0" y="0"/>
+            <a:ext cx="2971800" cy="458788"/>
+          </a:xfrm>
+          <a:prstGeom prst="rect">
+            <a:avLst/>
+          </a:prstGeom>
+        </p:spPr>
+        <p:txBody>
+          <a:bodyPr vert="horz" lIns="91440" tIns="45720" rIns="91440" bIns="45720" rtlCol="0"/>
+          <a:lstStyle>
+            <a:lvl1pPr algn="l">
+              <a:defRPr sz="1200"/>
+            </a:lvl1pPr>
+          </a:lstStyle>
+          <a:p>
+            <a:endParaRPr lang="en-US"/>
+          </a:p>
+        </p:txBody>
+      </p:sp>
+      <p:sp>
+        <p:nvSpPr>
+          <p:cNvPr id="3" name="Date Placeholder 2"/>
+          <p:cNvSpPr>
+            <a:spLocks noGrp="1"/>
+          </p:cNvSpPr>
+          <p:nvPr>
+            <p:ph type="dt" idx="1"/>
+          </p:nvPr>
+        </p:nvSpPr>
+        <p:spPr>
+          <a:xfrm>
+            <a:off x="3884613" y="0"/>
+            <a:ext cx="2971800" cy="458788"/>
+          </a:xfrm>
+          <a:prstGeom prst="rect">
+            <a:avLst/>
+          </a:prstGeom>
+        </p:spPr>
+        <p:txBody>
+          <a:bodyPr vert="horz" lIns="91440" tIns="45720" rIns="91440" bIns="45720" rtlCol="0"/>
+          <a:lstStyle>
+            <a:lvl1pPr algn="r">
+              <a:defRPr sz="1200"/>
+            </a:lvl1pPr>
+          </a:lstStyle>
+          <a:p>
+            <a:fld id="{2863C8FA-B8BC-9144-A506-E432740B92D8}" type="datetimeFigureOut">
+              <a:rPr lang="en-US" smtClean="0"/>
+              <a:t>3/4/19</a:t>
+            </a:fld>
+            <a:endParaRPr lang="en-US"/>
+          </a:p>
+        </p:txBody>
+      </p:sp>
+      <p:sp>
+        <p:nvSpPr>
+          <p:cNvPr id="4" name="Slide Image Placeholder 3"/>
+          <p:cNvSpPr>
+            <a:spLocks noGrp="1" noRot="1" noChangeAspect="1"/>
+          </p:cNvSpPr>
+          <p:nvPr>
+            <p:ph type="sldImg" idx="2"/>
+          </p:nvPr>
+        </p:nvSpPr>
+        <p:spPr>
+          <a:xfrm>
+            <a:off x="685800" y="1143000"/>
+            <a:ext cx="5486400" cy="3086100"/>
+          </a:xfrm>
+          <a:prstGeom prst="rect">
+            <a:avLst/>
+          </a:prstGeom>
+          <a:noFill/>
+          <a:ln w="12700">
+            <a:solidFill>
+              <a:prstClr val="black"/>
+            </a:solidFill>
+          </a:ln>
+        </p:spPr>
+        <p:txBody>
+          <a:bodyPr vert="horz" lIns="91440" tIns="45720" rIns="91440" bIns="45720" rtlCol="0" anchor="ctr"/>
+          <a:lstStyle/>
+          <a:p>
+            <a:endParaRPr lang="en-US"/>
+          </a:p>
+        </p:txBody>
+      </p:sp>
+      <p:sp>
+        <p:nvSpPr>
+          <p:cNvPr id="5" name="Notes Placeholder 4"/>
+          <p:cNvSpPr>
+            <a:spLocks noGrp="1"/>
+          </p:cNvSpPr>
+          <p:nvPr>
+            <p:ph type="body" sz="quarter" idx="3"/>
+          </p:nvPr>
+        </p:nvSpPr>
+        <p:spPr>
+          <a:xfrm>
+            <a:off x="685800" y="4400550"/>
+            <a:ext cx="5486400" cy="3600450"/>
+          </a:xfrm>
+          <a:prstGeom prst="rect">
+            <a:avLst/>
+          </a:prstGeom>
+        </p:spPr>
+        <p:txBody>
+          <a:bodyPr vert="horz" lIns="91440" tIns="45720" rIns="91440" bIns="45720" rtlCol="0"/>
+          <a:lstStyle/>
+          <a:p>
+            <a:pPr lvl="0"/>
+            <a:r>
+              <a:rPr lang="en-US" smtClean="0"/>
+              <a:t>Click to edit Master text styles</a:t>
+            </a:r>
+          </a:p>
+          <a:p>
+            <a:pPr lvl="1"/>
+            <a:r>
+              <a:rPr lang="en-US" smtClean="0"/>
+              <a:t>Second level</a:t>
+            </a:r>
+          </a:p>
+          <a:p>
+            <a:pPr lvl="2"/>
+            <a:r>
+              <a:rPr lang="en-US" smtClean="0"/>
+              <a:t>Third level</a:t>
+            </a:r>
+          </a:p>
+          <a:p>
+            <a:pPr lvl="3"/>
+            <a:r>
+              <a:rPr lang="en-US" smtClean="0"/>
+              <a:t>Fourth level</a:t>
+            </a:r>
+          </a:p>
+          <a:p>
+            <a:pPr lvl="4"/>
+            <a:r>
+              <a:rPr lang="en-US" smtClean="0"/>
+              <a:t>Fifth level</a:t>
+            </a:r>
+            <a:endParaRPr lang="en-US"/>
+          </a:p>
+        </p:txBody>
+      </p:sp>
+      <p:sp>
+        <p:nvSpPr>
+          <p:cNvPr id="6" name="Footer Placeholder 5"/>
+          <p:cNvSpPr>
+            <a:spLocks noGrp="1"/>
+          </p:cNvSpPr>
+          <p:nvPr>
+            <p:ph type="ftr" sz="quarter" idx="4"/>
+          </p:nvPr>
+        </p:nvSpPr>
+        <p:spPr>
+          <a:xfrm>
+            <a:off x="0" y="8685213"/>
+            <a:ext cx="2971800" cy="458787"/>
+          </a:xfrm>
+          <a:prstGeom prst="rect">
+            <a:avLst/>
+          </a:prstGeom>
+        </p:spPr>
+        <p:txBody>
+          <a:bodyPr vert="horz" lIns="91440" tIns="45720" rIns="91440" bIns="45720" rtlCol="0" anchor="b"/>
+          <a:lstStyle>
+            <a:lvl1pPr algn="l">
+              <a:defRPr sz="1200"/>
+            </a:lvl1pPr>
+          </a:lstStyle>
+          <a:p>
+            <a:endParaRPr lang="en-US"/>
+          </a:p>
+        </p:txBody>
+      </p:sp>
+      <p:sp>
+        <p:nvSpPr>
+          <p:cNvPr id="7" name="Slide Number Placeholder 6"/>
+          <p:cNvSpPr>
+            <a:spLocks noGrp="1"/>
+          </p:cNvSpPr>
+          <p:nvPr>
+            <p:ph type="sldNum" sz="quarter" idx="5"/>
+          </p:nvPr>
+        </p:nvSpPr>
+        <p:spPr>
+          <a:xfrm>
+            <a:off x="3884613" y="8685213"/>
+            <a:ext cx="2971800" cy="458787"/>
+          </a:xfrm>
+          <a:prstGeom prst="rect">
+            <a:avLst/>
+          </a:prstGeom>
+        </p:spPr>
+        <p:txBody>
+          <a:bodyPr vert="horz" lIns="91440" tIns="45720" rIns="91440" bIns="45720" rtlCol="0" anchor="b"/>
+          <a:lstStyle>
+            <a:lvl1pPr algn="r">
+              <a:defRPr sz="1200"/>
+            </a:lvl1pPr>
+          </a:lstStyle>
+          <a:p>
+            <a:fld id="{8F8BBEC8-0034-C349-BDE4-EE6CFFE1971A}" type="slidenum">
+              <a:rPr lang="en-US" smtClean="0"/>
+              <a:t>‹#›</a:t>
+            </a:fld>
+            <a:endParaRPr lang="en-US"/>
+          </a:p>
+        </p:txBody>
+      </p:sp>
+    </p:spTree>
+    <p:extLst>
+      <p:ext uri="{BB962C8B-B14F-4D97-AF65-F5344CB8AC3E}">
+        <p14:creationId xmlns:p14="http://schemas.microsoft.com/office/powerpoint/2010/main" val="276809300"/>
+      </p:ext>
+    </p:extLst>
+  </p:cSld>
+  <p:clrMap bg1="lt1" tx1="dk1" bg2="lt2" tx2="dk2" accent1="accent1" accent2="accent2" accent3="accent3" accent4="accent4" accent5="accent5" accent6="accent6" hlink="hlink" folHlink="folHlink"/>
+  <p:notesStyle>
+    <a:lvl1pPr marL="0" algn="l" defTabSz="914400" rtl="0" eaLnBrk="1" latinLnBrk="0" hangingPunct="1">
+      <a:defRPr sz="1200" kern="1200">
+        <a:solidFill>
+          <a:schemeClr val="tx1"/>
+        </a:solidFill>
+        <a:latin typeface="+mn-lt"/>
+        <a:ea typeface="+mn-ea"/>
+        <a:cs typeface="+mn-cs"/>
+      </a:defRPr>
+    </a:lvl1pPr>
+    <a:lvl2pPr marL="457200" algn="l" defTabSz="914400" rtl="0" eaLnBrk="1" latinLnBrk="0" hangingPunct="1">
+      <a:defRPr sz="1200" kern="1200">
+        <a:solidFill>
+          <a:schemeClr val="tx1"/>
+        </a:solidFill>
+        <a:latin typeface="+mn-lt"/>
+        <a:ea typeface="+mn-ea"/>
+        <a:cs typeface="+mn-cs"/>
+      </a:defRPr>
+    </a:lvl2pPr>
+    <a:lvl3pPr marL="914400" algn="l" defTabSz="914400" rtl="0" eaLnBrk="1" latinLnBrk="0" hangingPunct="1">
+      <a:defRPr sz="1200" kern="1200">
+        <a:solidFill>
+          <a:schemeClr val="tx1"/>
+        </a:solidFill>
+        <a:latin typeface="+mn-lt"/>
+        <a:ea typeface="+mn-ea"/>
+        <a:cs typeface="+mn-cs"/>
+      </a:defRPr>
+    </a:lvl3pPr>
+    <a:lvl4pPr marL="1371600" algn="l" defTabSz="914400" rtl="0" eaLnBrk="1" latinLnBrk="0" hangingPunct="1">
+      <a:defRPr sz="1200" kern="1200">
+        <a:solidFill>
+          <a:schemeClr val="tx1"/>
+        </a:solidFill>
+        <a:latin typeface="+mn-lt"/>
+        <a:ea typeface="+mn-ea"/>
+        <a:cs typeface="+mn-cs"/>
+      </a:defRPr>
+    </a:lvl4pPr>
+    <a:lvl5pPr marL="1828800" algn="l" defTabSz="914400" rtl="0" eaLnBrk="1" latinLnBrk="0" hangingPunct="1">
+      <a:defRPr sz="1200" kern="1200">
+        <a:solidFill>
+          <a:schemeClr val="tx1"/>
+        </a:solidFill>
+        <a:latin typeface="+mn-lt"/>
+        <a:ea typeface="+mn-ea"/>
+        <a:cs typeface="+mn-cs"/>
+      </a:defRPr>
+    </a:lvl5pPr>
+    <a:lvl6pPr marL="2286000" algn="l" defTabSz="914400" rtl="0" eaLnBrk="1" latinLnBrk="0" hangingPunct="1">
+      <a:defRPr sz="1200" kern="1200">
+        <a:solidFill>
+          <a:schemeClr val="tx1"/>
+        </a:solidFill>
+        <a:latin typeface="+mn-lt"/>
+        <a:ea typeface="+mn-ea"/>
+        <a:cs typeface="+mn-cs"/>
+      </a:defRPr>
+    </a:lvl6pPr>
+    <a:lvl7pPr marL="2743200" algn="l" defTabSz="914400" rtl="0" eaLnBrk="1" latinLnBrk="0" hangingPunct="1">
+      <a:defRPr sz="1200" kern="1200">
+        <a:solidFill>
+          <a:schemeClr val="tx1"/>
+        </a:solidFill>
+        <a:latin typeface="+mn-lt"/>
+        <a:ea typeface="+mn-ea"/>
+        <a:cs typeface="+mn-cs"/>
+      </a:defRPr>
+    </a:lvl7pPr>
+    <a:lvl8pPr marL="3200400" algn="l" defTabSz="914400" rtl="0" eaLnBrk="1" latinLnBrk="0" hangingPunct="1">
+      <a:defRPr sz="1200" kern="1200">
+        <a:solidFill>
+          <a:schemeClr val="tx1"/>
+        </a:solidFill>
+        <a:latin typeface="+mn-lt"/>
+        <a:ea typeface="+mn-ea"/>
+        <a:cs typeface="+mn-cs"/>
+      </a:defRPr>
+    </a:lvl8pPr>
+    <a:lvl9pPr marL="3657600" algn="l" defTabSz="914400" rtl="0" eaLnBrk="1" latinLnBrk="0" hangingPunct="1">
+      <a:defRPr sz="1200" kern="1200">
+        <a:solidFill>
+          <a:schemeClr val="tx1"/>
+        </a:solidFill>
+        <a:latin typeface="+mn-lt"/>
+        <a:ea typeface="+mn-ea"/>
+        <a:cs typeface="+mn-cs"/>
+      </a:defRPr>
+    </a:lvl9pPr>
+  </p:notesStyle>
+</p:notesMaster>
+</file>
+
+<file path=ppt/notesSlides/notesSlide1.xml><?xml version="1.0" encoding="utf-8"?>
+<p:notes xmlns:a="http://schemas.openxmlformats.org/drawingml/2006/main" xmlns:r="http://schemas.openxmlformats.org/officeDocument/2006/relationships" xmlns:p="http://schemas.openxmlformats.org/presentationml/2006/main">
+  <p:cSld>
+    <p:spTree>
+      <p:nvGrpSpPr>
+        <p:cNvPr id="1" name=""/>
+        <p:cNvGrpSpPr/>
+        <p:nvPr/>
+      </p:nvGrpSpPr>
+      <p:grpSpPr>
+        <a:xfrm>
+          <a:off x="0" y="0"/>
+          <a:ext cx="0" cy="0"/>
+          <a:chOff x="0" y="0"/>
+          <a:chExt cx="0" cy="0"/>
+        </a:xfrm>
+      </p:grpSpPr>
+      <p:sp>
+        <p:nvSpPr>
+          <p:cNvPr id="2" name="Slide Image Placeholder 1"/>
+          <p:cNvSpPr>
+            <a:spLocks noGrp="1" noRot="1" noChangeAspect="1"/>
+          </p:cNvSpPr>
+          <p:nvPr>
+            <p:ph type="sldImg"/>
+          </p:nvPr>
+        </p:nvSpPr>
+        <p:spPr/>
+      </p:sp>
+      <p:sp>
+        <p:nvSpPr>
+          <p:cNvPr id="3" name="Notes Placeholder 2"/>
+          <p:cNvSpPr>
+            <a:spLocks noGrp="1"/>
+          </p:cNvSpPr>
+          <p:nvPr>
+            <p:ph type="body" idx="1"/>
+          </p:nvPr>
+        </p:nvSpPr>
+        <p:spPr/>
+        <p:txBody>
+          <a:bodyPr/>
+          <a:lstStyle/>
+          <a:p>
+            <a:endParaRPr lang="en-US" dirty="0"/>
+          </a:p>
+        </p:txBody>
+      </p:sp>
+      <p:sp>
+        <p:nvSpPr>
+          <p:cNvPr id="4" name="Slide Number Placeholder 3"/>
+          <p:cNvSpPr>
+            <a:spLocks noGrp="1"/>
+          </p:cNvSpPr>
+          <p:nvPr>
+            <p:ph type="sldNum" sz="quarter" idx="10"/>
+          </p:nvPr>
+        </p:nvSpPr>
+        <p:spPr/>
+        <p:txBody>
+          <a:bodyPr/>
+          <a:lstStyle/>
+          <a:p>
+            <a:fld id="{8F8BBEC8-0034-C349-BDE4-EE6CFFE1971A}" type="slidenum">
+              <a:rPr lang="en-US" smtClean="0"/>
+              <a:t>3</a:t>
+            </a:fld>
+            <a:endParaRPr lang="en-US"/>
+          </a:p>
+        </p:txBody>
+      </p:sp>
+    </p:spTree>
+    <p:extLst>
+      <p:ext uri="{BB962C8B-B14F-4D97-AF65-F5344CB8AC3E}">
+        <p14:creationId xmlns:p14="http://schemas.microsoft.com/office/powerpoint/2010/main" val="884325698"/>
+      </p:ext>
+    </p:extLst>
+  </p:cSld>
+  <p:clrMapOvr>
+    <a:masterClrMapping/>
+  </p:clrMapOvr>
+</p:notes>
+</file>
+
 <file path=ppt/slideLayouts/slideLayout1.xml><?xml version="1.0" encoding="utf-8"?>
 <p:sldLayout xmlns:a="http://schemas.openxmlformats.org/drawingml/2006/main" xmlns:r="http://schemas.openxmlformats.org/officeDocument/2006/relationships" xmlns:p="http://schemas.openxmlformats.org/presentationml/2006/main" type="title" preserve="1">
   <p:cSld name="Title Slide">
@@ -244,7 +683,7 @@
           <a:p>
             <a:fld id="{5D97E163-DB95-D24D-8C95-263DECB1FC34}" type="datetimeFigureOut">
               <a:rPr lang="en-US" smtClean="0"/>
-              <a:t>2/20/19</a:t>
+              <a:t>3/4/19</a:t>
             </a:fld>
             <a:endParaRPr lang="en-US"/>
           </a:p>
@@ -414,7 +853,7 @@
           <a:p>
             <a:fld id="{5D97E163-DB95-D24D-8C95-263DECB1FC34}" type="datetimeFigureOut">
               <a:rPr lang="en-US" smtClean="0"/>
-              <a:t>2/20/19</a:t>
+              <a:t>3/4/19</a:t>
             </a:fld>
             <a:endParaRPr lang="en-US"/>
           </a:p>
@@ -594,7 +1033,7 @@
           <a:p>
             <a:fld id="{5D97E163-DB95-D24D-8C95-263DECB1FC34}" type="datetimeFigureOut">
               <a:rPr lang="en-US" smtClean="0"/>
-              <a:t>2/20/19</a:t>
+              <a:t>3/4/19</a:t>
             </a:fld>
             <a:endParaRPr lang="en-US"/>
           </a:p>
@@ -764,7 +1203,7 @@
           <a:p>
             <a:fld id="{5D97E163-DB95-D24D-8C95-263DECB1FC34}" type="datetimeFigureOut">
               <a:rPr lang="en-US" smtClean="0"/>
-              <a:t>2/20/19</a:t>
+              <a:t>3/4/19</a:t>
             </a:fld>
             <a:endParaRPr lang="en-US"/>
           </a:p>
@@ -1010,7 +1449,7 @@
           <a:p>
             <a:fld id="{5D97E163-DB95-D24D-8C95-263DECB1FC34}" type="datetimeFigureOut">
               <a:rPr lang="en-US" smtClean="0"/>
-              <a:t>2/20/19</a:t>
+              <a:t>3/4/19</a:t>
             </a:fld>
             <a:endParaRPr lang="en-US"/>
           </a:p>
@@ -1242,7 +1681,7 @@
           <a:p>
             <a:fld id="{5D97E163-DB95-D24D-8C95-263DECB1FC34}" type="datetimeFigureOut">
               <a:rPr lang="en-US" smtClean="0"/>
-              <a:t>2/20/19</a:t>
+              <a:t>3/4/19</a:t>
             </a:fld>
             <a:endParaRPr lang="en-US"/>
           </a:p>
@@ -1609,7 +2048,7 @@
           <a:p>
             <a:fld id="{5D97E163-DB95-D24D-8C95-263DECB1FC34}" type="datetimeFigureOut">
               <a:rPr lang="en-US" smtClean="0"/>
-              <a:t>2/20/19</a:t>
+              <a:t>3/4/19</a:t>
             </a:fld>
             <a:endParaRPr lang="en-US"/>
           </a:p>
@@ -1727,7 +2166,7 @@
           <a:p>
             <a:fld id="{5D97E163-DB95-D24D-8C95-263DECB1FC34}" type="datetimeFigureOut">
               <a:rPr lang="en-US" smtClean="0"/>
-              <a:t>2/20/19</a:t>
+              <a:t>3/4/19</a:t>
             </a:fld>
             <a:endParaRPr lang="en-US"/>
           </a:p>
@@ -1822,7 +2261,7 @@
           <a:p>
             <a:fld id="{5D97E163-DB95-D24D-8C95-263DECB1FC34}" type="datetimeFigureOut">
               <a:rPr lang="en-US" smtClean="0"/>
-              <a:t>2/20/19</a:t>
+              <a:t>3/4/19</a:t>
             </a:fld>
             <a:endParaRPr lang="en-US"/>
           </a:p>
@@ -2099,7 +2538,7 @@
           <a:p>
             <a:fld id="{5D97E163-DB95-D24D-8C95-263DECB1FC34}" type="datetimeFigureOut">
               <a:rPr lang="en-US" smtClean="0"/>
-              <a:t>2/20/19</a:t>
+              <a:t>3/4/19</a:t>
             </a:fld>
             <a:endParaRPr lang="en-US"/>
           </a:p>
@@ -2352,7 +2791,7 @@
           <a:p>
             <a:fld id="{5D97E163-DB95-D24D-8C95-263DECB1FC34}" type="datetimeFigureOut">
               <a:rPr lang="en-US" smtClean="0"/>
-              <a:t>2/20/19</a:t>
+              <a:t>3/4/19</a:t>
             </a:fld>
             <a:endParaRPr lang="en-US"/>
           </a:p>
@@ -2565,7 +3004,7 @@
           <a:p>
             <a:fld id="{5D97E163-DB95-D24D-8C95-263DECB1FC34}" type="datetimeFigureOut">
               <a:rPr lang="en-US" smtClean="0"/>
-              <a:t>2/20/19</a:t>
+              <a:t>3/4/19</a:t>
             </a:fld>
             <a:endParaRPr lang="en-US"/>
           </a:p>
@@ -5626,6 +6065,3293 @@
 </p:sld>
 </file>
 
+<file path=ppt/slides/slide3.xml><?xml version="1.0" encoding="utf-8"?>
+<p:sld xmlns:a="http://schemas.openxmlformats.org/drawingml/2006/main" xmlns:r="http://schemas.openxmlformats.org/officeDocument/2006/relationships" xmlns:p="http://schemas.openxmlformats.org/presentationml/2006/main">
+  <p:cSld>
+    <p:spTree>
+      <p:nvGrpSpPr>
+        <p:cNvPr id="1" name=""/>
+        <p:cNvGrpSpPr/>
+        <p:nvPr/>
+      </p:nvGrpSpPr>
+      <p:grpSpPr>
+        <a:xfrm>
+          <a:off x="0" y="0"/>
+          <a:ext cx="0" cy="0"/>
+          <a:chOff x="0" y="0"/>
+          <a:chExt cx="0" cy="0"/>
+        </a:xfrm>
+      </p:grpSpPr>
+      <p:sp>
+        <p:nvSpPr>
+          <p:cNvPr id="29" name="Rectangle 28"/>
+          <p:cNvSpPr/>
+          <p:nvPr/>
+        </p:nvSpPr>
+        <p:spPr>
+          <a:xfrm>
+            <a:off x="2636364" y="3275976"/>
+            <a:ext cx="1454647" cy="677739"/>
+          </a:xfrm>
+          <a:prstGeom prst="rect">
+            <a:avLst/>
+          </a:prstGeom>
+          <a:solidFill>
+            <a:srgbClr val="CFE7F1"/>
+          </a:solidFill>
+          <a:ln w="57150">
+            <a:solidFill>
+              <a:srgbClr val="00B0F0"/>
+            </a:solidFill>
+          </a:ln>
+        </p:spPr>
+        <p:style>
+          <a:lnRef idx="2">
+            <a:schemeClr val="accent1">
+              <a:shade val="50000"/>
+            </a:schemeClr>
+          </a:lnRef>
+          <a:fillRef idx="1">
+            <a:schemeClr val="accent1"/>
+          </a:fillRef>
+          <a:effectRef idx="0">
+            <a:schemeClr val="accent1"/>
+          </a:effectRef>
+          <a:fontRef idx="minor">
+            <a:schemeClr val="lt1"/>
+          </a:fontRef>
+        </p:style>
+        <p:txBody>
+          <a:bodyPr rtlCol="0" anchor="ctr"/>
+          <a:lstStyle/>
+          <a:p>
+            <a:pPr algn="ctr"/>
+            <a:r>
+              <a:rPr lang="en-US" sz="2800" dirty="0" smtClean="0">
+                <a:solidFill>
+                  <a:schemeClr val="tx1"/>
+                </a:solidFill>
+              </a:rPr>
+              <a:t>IP</a:t>
+            </a:r>
+            <a:endParaRPr lang="en-US" sz="2800" dirty="0">
+              <a:solidFill>
+                <a:schemeClr val="tx1"/>
+              </a:solidFill>
+            </a:endParaRPr>
+          </a:p>
+        </p:txBody>
+      </p:sp>
+      <p:sp>
+        <p:nvSpPr>
+          <p:cNvPr id="30" name="Rectangle 29"/>
+          <p:cNvSpPr/>
+          <p:nvPr/>
+        </p:nvSpPr>
+        <p:spPr>
+          <a:xfrm>
+            <a:off x="2074697" y="2252736"/>
+            <a:ext cx="1253786" cy="677739"/>
+          </a:xfrm>
+          <a:prstGeom prst="rect">
+            <a:avLst/>
+          </a:prstGeom>
+          <a:ln/>
+        </p:spPr>
+        <p:style>
+          <a:lnRef idx="2">
+            <a:schemeClr val="dk1"/>
+          </a:lnRef>
+          <a:fillRef idx="1">
+            <a:schemeClr val="lt1"/>
+          </a:fillRef>
+          <a:effectRef idx="0">
+            <a:schemeClr val="dk1"/>
+          </a:effectRef>
+          <a:fontRef idx="minor">
+            <a:schemeClr val="dk1"/>
+          </a:fontRef>
+        </p:style>
+        <p:txBody>
+          <a:bodyPr rtlCol="0" anchor="ctr"/>
+          <a:lstStyle/>
+          <a:p>
+            <a:pPr algn="ctr"/>
+            <a:r>
+              <a:rPr lang="en-US" sz="2800" dirty="0" smtClean="0">
+                <a:solidFill>
+                  <a:schemeClr val="tx1"/>
+                </a:solidFill>
+              </a:rPr>
+              <a:t>TCP</a:t>
+            </a:r>
+            <a:endParaRPr lang="en-US" sz="2800" dirty="0">
+              <a:solidFill>
+                <a:schemeClr val="tx1"/>
+              </a:solidFill>
+            </a:endParaRPr>
+          </a:p>
+        </p:txBody>
+      </p:sp>
+      <p:cxnSp>
+        <p:nvCxnSpPr>
+          <p:cNvPr id="6" name="Straight Connector 5"/>
+          <p:cNvCxnSpPr/>
+          <p:nvPr/>
+        </p:nvCxnSpPr>
+        <p:spPr>
+          <a:xfrm>
+            <a:off x="4091011" y="3953715"/>
+            <a:ext cx="2536193" cy="795726"/>
+          </a:xfrm>
+          <a:prstGeom prst="line">
+            <a:avLst/>
+          </a:prstGeom>
+          <a:ln w="28575">
+            <a:solidFill>
+              <a:srgbClr val="00B0F0"/>
+            </a:solidFill>
+          </a:ln>
+        </p:spPr>
+        <p:style>
+          <a:lnRef idx="1">
+            <a:schemeClr val="accent1"/>
+          </a:lnRef>
+          <a:fillRef idx="0">
+            <a:schemeClr val="accent1"/>
+          </a:fillRef>
+          <a:effectRef idx="0">
+            <a:schemeClr val="accent1"/>
+          </a:effectRef>
+          <a:fontRef idx="minor">
+            <a:schemeClr val="tx1"/>
+          </a:fontRef>
+        </p:style>
+      </p:cxnSp>
+      <p:cxnSp>
+        <p:nvCxnSpPr>
+          <p:cNvPr id="20" name="Straight Connector 19"/>
+          <p:cNvCxnSpPr/>
+          <p:nvPr/>
+        </p:nvCxnSpPr>
+        <p:spPr>
+          <a:xfrm flipH="1">
+            <a:off x="158108" y="3953715"/>
+            <a:ext cx="2478256" cy="845573"/>
+          </a:xfrm>
+          <a:prstGeom prst="line">
+            <a:avLst/>
+          </a:prstGeom>
+          <a:ln w="28575">
+            <a:solidFill>
+              <a:srgbClr val="00B0F0"/>
+            </a:solidFill>
+          </a:ln>
+        </p:spPr>
+        <p:style>
+          <a:lnRef idx="1">
+            <a:schemeClr val="accent1"/>
+          </a:lnRef>
+          <a:fillRef idx="0">
+            <a:schemeClr val="accent1"/>
+          </a:fillRef>
+          <a:effectRef idx="0">
+            <a:schemeClr val="accent1"/>
+          </a:effectRef>
+          <a:fontRef idx="minor">
+            <a:schemeClr val="tx1"/>
+          </a:fontRef>
+        </p:style>
+      </p:cxnSp>
+      <p:cxnSp>
+        <p:nvCxnSpPr>
+          <p:cNvPr id="18" name="Straight Connector 17"/>
+          <p:cNvCxnSpPr/>
+          <p:nvPr/>
+        </p:nvCxnSpPr>
+        <p:spPr>
+          <a:xfrm flipH="1" flipV="1">
+            <a:off x="152396" y="2104564"/>
+            <a:ext cx="2483968" cy="1166494"/>
+          </a:xfrm>
+          <a:prstGeom prst="line">
+            <a:avLst/>
+          </a:prstGeom>
+          <a:ln w="28575">
+            <a:solidFill>
+              <a:srgbClr val="00B0F0"/>
+            </a:solidFill>
+          </a:ln>
+        </p:spPr>
+        <p:style>
+          <a:lnRef idx="1">
+            <a:schemeClr val="accent1"/>
+          </a:lnRef>
+          <a:fillRef idx="0">
+            <a:schemeClr val="accent1"/>
+          </a:fillRef>
+          <a:effectRef idx="0">
+            <a:schemeClr val="accent1"/>
+          </a:effectRef>
+          <a:fontRef idx="minor">
+            <a:schemeClr val="tx1"/>
+          </a:fontRef>
+        </p:style>
+      </p:cxnSp>
+      <p:sp>
+        <p:nvSpPr>
+          <p:cNvPr id="57" name="Rectangle 56"/>
+          <p:cNvSpPr/>
+          <p:nvPr/>
+        </p:nvSpPr>
+        <p:spPr>
+          <a:xfrm>
+            <a:off x="9102607" y="3945194"/>
+            <a:ext cx="1460358" cy="482120"/>
+          </a:xfrm>
+          <a:prstGeom prst="rect">
+            <a:avLst/>
+          </a:prstGeom>
+          <a:solidFill>
+            <a:srgbClr val="CFE7F1"/>
+          </a:solidFill>
+          <a:ln w="57150">
+            <a:solidFill>
+              <a:srgbClr val="00B0F0"/>
+            </a:solidFill>
+          </a:ln>
+        </p:spPr>
+        <p:style>
+          <a:lnRef idx="2">
+            <a:schemeClr val="accent1">
+              <a:shade val="50000"/>
+            </a:schemeClr>
+          </a:lnRef>
+          <a:fillRef idx="1">
+            <a:schemeClr val="accent1"/>
+          </a:fillRef>
+          <a:effectRef idx="0">
+            <a:schemeClr val="accent1"/>
+          </a:effectRef>
+          <a:fontRef idx="minor">
+            <a:schemeClr val="lt1"/>
+          </a:fontRef>
+        </p:style>
+        <p:txBody>
+          <a:bodyPr rtlCol="0" anchor="ctr"/>
+          <a:lstStyle/>
+          <a:p>
+            <a:pPr algn="ctr"/>
+            <a:r>
+              <a:rPr lang="en-US" sz="2800" dirty="0" smtClean="0">
+                <a:solidFill>
+                  <a:schemeClr val="tx1"/>
+                </a:solidFill>
+              </a:rPr>
+              <a:t>IP</a:t>
+            </a:r>
+            <a:endParaRPr lang="en-US" sz="2800" dirty="0">
+              <a:solidFill>
+                <a:schemeClr val="tx1"/>
+              </a:solidFill>
+            </a:endParaRPr>
+          </a:p>
+        </p:txBody>
+      </p:sp>
+      <p:sp>
+        <p:nvSpPr>
+          <p:cNvPr id="58" name="Rectangle 57"/>
+          <p:cNvSpPr/>
+          <p:nvPr/>
+        </p:nvSpPr>
+        <p:spPr>
+          <a:xfrm>
+            <a:off x="9102606" y="3462727"/>
+            <a:ext cx="1460357" cy="482120"/>
+          </a:xfrm>
+          <a:prstGeom prst="rect">
+            <a:avLst/>
+          </a:prstGeom>
+          <a:solidFill>
+            <a:srgbClr val="CFE7F1"/>
+          </a:solidFill>
+          <a:ln w="57150">
+            <a:solidFill>
+              <a:srgbClr val="00B0F0"/>
+            </a:solidFill>
+          </a:ln>
+        </p:spPr>
+        <p:style>
+          <a:lnRef idx="2">
+            <a:schemeClr val="accent1">
+              <a:shade val="50000"/>
+            </a:schemeClr>
+          </a:lnRef>
+          <a:fillRef idx="1">
+            <a:schemeClr val="accent1"/>
+          </a:fillRef>
+          <a:effectRef idx="0">
+            <a:schemeClr val="accent1"/>
+          </a:effectRef>
+          <a:fontRef idx="minor">
+            <a:schemeClr val="lt1"/>
+          </a:fontRef>
+        </p:style>
+        <p:txBody>
+          <a:bodyPr rtlCol="0" anchor="ctr"/>
+          <a:lstStyle/>
+          <a:p>
+            <a:pPr algn="ctr"/>
+            <a:r>
+              <a:rPr lang="en-US" sz="2800" dirty="0" smtClean="0">
+                <a:solidFill>
+                  <a:schemeClr val="tx1"/>
+                </a:solidFill>
+              </a:rPr>
+              <a:t>TCP</a:t>
+            </a:r>
+            <a:endParaRPr lang="en-US" sz="2800" dirty="0">
+              <a:solidFill>
+                <a:schemeClr val="tx1"/>
+              </a:solidFill>
+            </a:endParaRPr>
+          </a:p>
+        </p:txBody>
+      </p:sp>
+      <p:sp>
+        <p:nvSpPr>
+          <p:cNvPr id="59" name="Rectangle 58"/>
+          <p:cNvSpPr/>
+          <p:nvPr/>
+        </p:nvSpPr>
+        <p:spPr>
+          <a:xfrm>
+            <a:off x="9102606" y="2980607"/>
+            <a:ext cx="1454647" cy="482120"/>
+          </a:xfrm>
+          <a:prstGeom prst="rect">
+            <a:avLst/>
+          </a:prstGeom>
+          <a:solidFill>
+            <a:srgbClr val="CFE7F1"/>
+          </a:solidFill>
+          <a:ln w="57150">
+            <a:solidFill>
+              <a:srgbClr val="00B0F0"/>
+            </a:solidFill>
+          </a:ln>
+        </p:spPr>
+        <p:style>
+          <a:lnRef idx="2">
+            <a:schemeClr val="accent1">
+              <a:shade val="50000"/>
+            </a:schemeClr>
+          </a:lnRef>
+          <a:fillRef idx="1">
+            <a:schemeClr val="accent1"/>
+          </a:fillRef>
+          <a:effectRef idx="0">
+            <a:schemeClr val="accent1"/>
+          </a:effectRef>
+          <a:fontRef idx="minor">
+            <a:schemeClr val="lt1"/>
+          </a:fontRef>
+        </p:style>
+        <p:txBody>
+          <a:bodyPr rtlCol="0" anchor="ctr"/>
+          <a:lstStyle/>
+          <a:p>
+            <a:pPr algn="ctr"/>
+            <a:r>
+              <a:rPr lang="en-US" sz="2800" dirty="0" smtClean="0">
+                <a:solidFill>
+                  <a:schemeClr val="tx1"/>
+                </a:solidFill>
+              </a:rPr>
+              <a:t>TLS</a:t>
+            </a:r>
+            <a:endParaRPr lang="en-US" sz="2800" dirty="0">
+              <a:solidFill>
+                <a:schemeClr val="tx1"/>
+              </a:solidFill>
+            </a:endParaRPr>
+          </a:p>
+        </p:txBody>
+      </p:sp>
+      <p:sp>
+        <p:nvSpPr>
+          <p:cNvPr id="60" name="Rectangle 59"/>
+          <p:cNvSpPr/>
+          <p:nvPr/>
+        </p:nvSpPr>
+        <p:spPr>
+          <a:xfrm>
+            <a:off x="9102606" y="2498140"/>
+            <a:ext cx="1454647" cy="482120"/>
+          </a:xfrm>
+          <a:prstGeom prst="rect">
+            <a:avLst/>
+          </a:prstGeom>
+          <a:solidFill>
+            <a:srgbClr val="CFE7F1"/>
+          </a:solidFill>
+          <a:ln w="57150">
+            <a:solidFill>
+              <a:srgbClr val="00B0F0"/>
+            </a:solidFill>
+          </a:ln>
+        </p:spPr>
+        <p:style>
+          <a:lnRef idx="2">
+            <a:schemeClr val="accent1">
+              <a:shade val="50000"/>
+            </a:schemeClr>
+          </a:lnRef>
+          <a:fillRef idx="1">
+            <a:schemeClr val="accent1"/>
+          </a:fillRef>
+          <a:effectRef idx="0">
+            <a:schemeClr val="accent1"/>
+          </a:effectRef>
+          <a:fontRef idx="minor">
+            <a:schemeClr val="lt1"/>
+          </a:fontRef>
+        </p:style>
+        <p:txBody>
+          <a:bodyPr rtlCol="0" anchor="ctr"/>
+          <a:lstStyle/>
+          <a:p>
+            <a:pPr algn="ctr"/>
+            <a:r>
+              <a:rPr lang="en-US" sz="2800" dirty="0" smtClean="0">
+                <a:solidFill>
+                  <a:schemeClr val="tx1"/>
+                </a:solidFill>
+              </a:rPr>
+              <a:t>HTTP</a:t>
+            </a:r>
+            <a:endParaRPr lang="en-US" sz="2800" dirty="0">
+              <a:solidFill>
+                <a:schemeClr val="tx1"/>
+              </a:solidFill>
+            </a:endParaRPr>
+          </a:p>
+        </p:txBody>
+      </p:sp>
+      <p:cxnSp>
+        <p:nvCxnSpPr>
+          <p:cNvPr id="227" name="Straight Connector 226"/>
+          <p:cNvCxnSpPr/>
+          <p:nvPr/>
+        </p:nvCxnSpPr>
+        <p:spPr>
+          <a:xfrm flipH="1" flipV="1">
+            <a:off x="8255984" y="1981771"/>
+            <a:ext cx="849478" cy="516372"/>
+          </a:xfrm>
+          <a:prstGeom prst="line">
+            <a:avLst/>
+          </a:prstGeom>
+          <a:ln w="28575">
+            <a:solidFill>
+              <a:srgbClr val="00B0F0"/>
+            </a:solidFill>
+          </a:ln>
+        </p:spPr>
+        <p:style>
+          <a:lnRef idx="1">
+            <a:schemeClr val="accent1"/>
+          </a:lnRef>
+          <a:fillRef idx="0">
+            <a:schemeClr val="accent1"/>
+          </a:fillRef>
+          <a:effectRef idx="0">
+            <a:schemeClr val="accent1"/>
+          </a:effectRef>
+          <a:fontRef idx="minor">
+            <a:schemeClr val="tx1"/>
+          </a:fontRef>
+        </p:style>
+      </p:cxnSp>
+      <p:cxnSp>
+        <p:nvCxnSpPr>
+          <p:cNvPr id="232" name="Straight Connector 231"/>
+          <p:cNvCxnSpPr/>
+          <p:nvPr/>
+        </p:nvCxnSpPr>
+        <p:spPr>
+          <a:xfrm flipV="1">
+            <a:off x="10557253" y="1999499"/>
+            <a:ext cx="754760" cy="498641"/>
+          </a:xfrm>
+          <a:prstGeom prst="line">
+            <a:avLst/>
+          </a:prstGeom>
+          <a:ln w="28575">
+            <a:solidFill>
+              <a:srgbClr val="00B0F0"/>
+            </a:solidFill>
+          </a:ln>
+        </p:spPr>
+        <p:style>
+          <a:lnRef idx="1">
+            <a:schemeClr val="accent1"/>
+          </a:lnRef>
+          <a:fillRef idx="0">
+            <a:schemeClr val="accent1"/>
+          </a:fillRef>
+          <a:effectRef idx="0">
+            <a:schemeClr val="accent1"/>
+          </a:effectRef>
+          <a:fontRef idx="minor">
+            <a:schemeClr val="tx1"/>
+          </a:fontRef>
+        </p:style>
+      </p:cxnSp>
+      <p:cxnSp>
+        <p:nvCxnSpPr>
+          <p:cNvPr id="234" name="Straight Connector 233"/>
+          <p:cNvCxnSpPr/>
+          <p:nvPr/>
+        </p:nvCxnSpPr>
+        <p:spPr>
+          <a:xfrm flipH="1">
+            <a:off x="8081851" y="4442062"/>
+            <a:ext cx="1020757" cy="681349"/>
+          </a:xfrm>
+          <a:prstGeom prst="line">
+            <a:avLst/>
+          </a:prstGeom>
+          <a:ln w="28575">
+            <a:solidFill>
+              <a:srgbClr val="00B0F0"/>
+            </a:solidFill>
+          </a:ln>
+        </p:spPr>
+        <p:style>
+          <a:lnRef idx="1">
+            <a:schemeClr val="accent1"/>
+          </a:lnRef>
+          <a:fillRef idx="0">
+            <a:schemeClr val="accent1"/>
+          </a:fillRef>
+          <a:effectRef idx="0">
+            <a:schemeClr val="accent1"/>
+          </a:effectRef>
+          <a:fontRef idx="minor">
+            <a:schemeClr val="tx1"/>
+          </a:fontRef>
+        </p:style>
+      </p:cxnSp>
+      <p:cxnSp>
+        <p:nvCxnSpPr>
+          <p:cNvPr id="237" name="Straight Connector 236"/>
+          <p:cNvCxnSpPr/>
+          <p:nvPr/>
+        </p:nvCxnSpPr>
+        <p:spPr>
+          <a:xfrm>
+            <a:off x="10557253" y="4442062"/>
+            <a:ext cx="754760" cy="497215"/>
+          </a:xfrm>
+          <a:prstGeom prst="line">
+            <a:avLst/>
+          </a:prstGeom>
+          <a:ln w="28575">
+            <a:solidFill>
+              <a:srgbClr val="00B0F0"/>
+            </a:solidFill>
+          </a:ln>
+        </p:spPr>
+        <p:style>
+          <a:lnRef idx="1">
+            <a:schemeClr val="accent1"/>
+          </a:lnRef>
+          <a:fillRef idx="0">
+            <a:schemeClr val="accent1"/>
+          </a:fillRef>
+          <a:effectRef idx="0">
+            <a:schemeClr val="accent1"/>
+          </a:effectRef>
+          <a:fontRef idx="minor">
+            <a:schemeClr val="tx1"/>
+          </a:fontRef>
+        </p:style>
+      </p:cxnSp>
+      <p:sp>
+        <p:nvSpPr>
+          <p:cNvPr id="68" name="Rounded Rectangle 67"/>
+          <p:cNvSpPr/>
+          <p:nvPr/>
+        </p:nvSpPr>
+        <p:spPr>
+          <a:xfrm>
+            <a:off x="8038000" y="4943683"/>
+            <a:ext cx="3583858" cy="677739"/>
+          </a:xfrm>
+          <a:prstGeom prst="roundRect">
+            <a:avLst>
+              <a:gd name="adj" fmla="val 50000"/>
+            </a:avLst>
+          </a:prstGeom>
+          <a:ln w="28575"/>
+        </p:spPr>
+        <p:style>
+          <a:lnRef idx="2">
+            <a:schemeClr val="dk1"/>
+          </a:lnRef>
+          <a:fillRef idx="1">
+            <a:schemeClr val="lt1"/>
+          </a:fillRef>
+          <a:effectRef idx="0">
+            <a:schemeClr val="dk1"/>
+          </a:effectRef>
+          <a:fontRef idx="minor">
+            <a:schemeClr val="dk1"/>
+          </a:fontRef>
+        </p:style>
+        <p:txBody>
+          <a:bodyPr rtlCol="0" anchor="ctr"/>
+          <a:lstStyle/>
+          <a:p>
+            <a:pPr algn="ctr"/>
+            <a:r>
+              <a:rPr lang="en-US" sz="2800" dirty="0" smtClean="0"/>
+              <a:t>Networks</a:t>
+            </a:r>
+            <a:endParaRPr lang="en-US" sz="2800" dirty="0"/>
+          </a:p>
+        </p:txBody>
+      </p:sp>
+      <p:sp>
+        <p:nvSpPr>
+          <p:cNvPr id="224" name="Rounded Rectangle 223"/>
+          <p:cNvSpPr/>
+          <p:nvPr/>
+        </p:nvSpPr>
+        <p:spPr>
+          <a:xfrm>
+            <a:off x="8040856" y="1321760"/>
+            <a:ext cx="3583858" cy="677739"/>
+          </a:xfrm>
+          <a:prstGeom prst="roundRect">
+            <a:avLst>
+              <a:gd name="adj" fmla="val 50000"/>
+            </a:avLst>
+          </a:prstGeom>
+          <a:ln w="28575"/>
+        </p:spPr>
+        <p:style>
+          <a:lnRef idx="2">
+            <a:schemeClr val="dk1"/>
+          </a:lnRef>
+          <a:fillRef idx="1">
+            <a:schemeClr val="lt1"/>
+          </a:fillRef>
+          <a:effectRef idx="0">
+            <a:schemeClr val="dk1"/>
+          </a:effectRef>
+          <a:fontRef idx="minor">
+            <a:schemeClr val="dk1"/>
+          </a:fontRef>
+        </p:style>
+        <p:txBody>
+          <a:bodyPr rtlCol="0" anchor="ctr"/>
+          <a:lstStyle/>
+          <a:p>
+            <a:pPr algn="ctr"/>
+            <a:r>
+              <a:rPr lang="en-US" sz="2800" dirty="0" smtClean="0"/>
+              <a:t>Applications</a:t>
+            </a:r>
+            <a:endParaRPr lang="en-US" sz="2800" dirty="0"/>
+          </a:p>
+        </p:txBody>
+      </p:sp>
+      <p:sp>
+        <p:nvSpPr>
+          <p:cNvPr id="239" name="Right Arrow 238"/>
+          <p:cNvSpPr/>
+          <p:nvPr/>
+        </p:nvSpPr>
+        <p:spPr>
+          <a:xfrm>
+            <a:off x="6719233" y="3230531"/>
+            <a:ext cx="1174692" cy="482120"/>
+          </a:xfrm>
+          <a:prstGeom prst="rightArrow">
+            <a:avLst/>
+          </a:prstGeom>
+        </p:spPr>
+        <p:style>
+          <a:lnRef idx="2">
+            <a:schemeClr val="accent1">
+              <a:shade val="50000"/>
+            </a:schemeClr>
+          </a:lnRef>
+          <a:fillRef idx="1">
+            <a:schemeClr val="accent1"/>
+          </a:fillRef>
+          <a:effectRef idx="0">
+            <a:schemeClr val="accent1"/>
+          </a:effectRef>
+          <a:fontRef idx="minor">
+            <a:schemeClr val="lt1"/>
+          </a:fontRef>
+        </p:style>
+        <p:txBody>
+          <a:bodyPr rtlCol="0" anchor="ctr"/>
+          <a:lstStyle/>
+          <a:p>
+            <a:pPr algn="ctr"/>
+            <a:endParaRPr lang="en-US"/>
+          </a:p>
+        </p:txBody>
+      </p:sp>
+      <p:sp>
+        <p:nvSpPr>
+          <p:cNvPr id="244" name="TextBox 243"/>
+          <p:cNvSpPr txBox="1"/>
+          <p:nvPr/>
+        </p:nvSpPr>
+        <p:spPr>
+          <a:xfrm>
+            <a:off x="6715710" y="2753499"/>
+            <a:ext cx="1063753" cy="646331"/>
+          </a:xfrm>
+          <a:prstGeom prst="rect">
+            <a:avLst/>
+          </a:prstGeom>
+          <a:noFill/>
+        </p:spPr>
+        <p:txBody>
+          <a:bodyPr wrap="none" rtlCol="0">
+            <a:spAutoFit/>
+          </a:bodyPr>
+          <a:lstStyle/>
+          <a:p>
+            <a:pPr algn="ctr"/>
+            <a:r>
+              <a:rPr lang="en-US" dirty="0" smtClean="0"/>
+              <a:t>Evolution</a:t>
+            </a:r>
+          </a:p>
+          <a:p>
+            <a:pPr algn="ctr"/>
+            <a:r>
+              <a:rPr lang="en-US" dirty="0"/>
+              <a:t>o</a:t>
+            </a:r>
+            <a:r>
+              <a:rPr lang="en-US" dirty="0" smtClean="0"/>
+              <a:t>f the </a:t>
+            </a:r>
+            <a:endParaRPr lang="en-US" dirty="0"/>
+          </a:p>
+        </p:txBody>
+      </p:sp>
+      <p:sp>
+        <p:nvSpPr>
+          <p:cNvPr id="81" name="TextBox 80"/>
+          <p:cNvSpPr txBox="1"/>
+          <p:nvPr/>
+        </p:nvSpPr>
+        <p:spPr>
+          <a:xfrm>
+            <a:off x="6804004" y="3570367"/>
+            <a:ext cx="887166" cy="646331"/>
+          </a:xfrm>
+          <a:prstGeom prst="rect">
+            <a:avLst/>
+          </a:prstGeom>
+          <a:noFill/>
+        </p:spPr>
+        <p:txBody>
+          <a:bodyPr wrap="none" rtlCol="0">
+            <a:spAutoFit/>
+          </a:bodyPr>
+          <a:lstStyle/>
+          <a:p>
+            <a:pPr algn="ctr"/>
+            <a:r>
+              <a:rPr lang="en-US" dirty="0" smtClean="0"/>
+              <a:t>Narrow</a:t>
+            </a:r>
+          </a:p>
+          <a:p>
+            <a:pPr algn="ctr"/>
+            <a:r>
+              <a:rPr lang="en-US" dirty="0" smtClean="0"/>
+              <a:t>Waist </a:t>
+            </a:r>
+            <a:endParaRPr lang="en-US" dirty="0"/>
+          </a:p>
+        </p:txBody>
+      </p:sp>
+      <p:cxnSp>
+        <p:nvCxnSpPr>
+          <p:cNvPr id="44" name="Straight Connector 43"/>
+          <p:cNvCxnSpPr/>
+          <p:nvPr/>
+        </p:nvCxnSpPr>
+        <p:spPr>
+          <a:xfrm flipV="1">
+            <a:off x="4091011" y="2138978"/>
+            <a:ext cx="2536194" cy="1132081"/>
+          </a:xfrm>
+          <a:prstGeom prst="line">
+            <a:avLst/>
+          </a:prstGeom>
+          <a:ln w="28575">
+            <a:solidFill>
+              <a:srgbClr val="00B0F0"/>
+            </a:solidFill>
+          </a:ln>
+        </p:spPr>
+        <p:style>
+          <a:lnRef idx="1">
+            <a:schemeClr val="accent1"/>
+          </a:lnRef>
+          <a:fillRef idx="0">
+            <a:schemeClr val="accent1"/>
+          </a:fillRef>
+          <a:effectRef idx="0">
+            <a:schemeClr val="accent1"/>
+          </a:effectRef>
+          <a:fontRef idx="minor">
+            <a:schemeClr val="tx1"/>
+          </a:fontRef>
+        </p:style>
+      </p:cxnSp>
+      <p:cxnSp>
+        <p:nvCxnSpPr>
+          <p:cNvPr id="253" name="Elbow Connector 252"/>
+          <p:cNvCxnSpPr/>
+          <p:nvPr/>
+        </p:nvCxnSpPr>
+        <p:spPr>
+          <a:xfrm flipV="1">
+            <a:off x="152396" y="1358005"/>
+            <a:ext cx="6474809" cy="746559"/>
+          </a:xfrm>
+          <a:prstGeom prst="bentConnector3">
+            <a:avLst>
+              <a:gd name="adj1" fmla="val 116"/>
+            </a:avLst>
+          </a:prstGeom>
+          <a:ln w="28575">
+            <a:solidFill>
+              <a:srgbClr val="00B0F0"/>
+            </a:solidFill>
+          </a:ln>
+        </p:spPr>
+        <p:style>
+          <a:lnRef idx="1">
+            <a:schemeClr val="accent1"/>
+          </a:lnRef>
+          <a:fillRef idx="0">
+            <a:schemeClr val="accent1"/>
+          </a:fillRef>
+          <a:effectRef idx="0">
+            <a:schemeClr val="accent1"/>
+          </a:effectRef>
+          <a:fontRef idx="minor">
+            <a:schemeClr val="tx1"/>
+          </a:fontRef>
+        </p:style>
+      </p:cxnSp>
+      <p:cxnSp>
+        <p:nvCxnSpPr>
+          <p:cNvPr id="56" name="Straight Connector 55"/>
+          <p:cNvCxnSpPr/>
+          <p:nvPr/>
+        </p:nvCxnSpPr>
+        <p:spPr>
+          <a:xfrm flipV="1">
+            <a:off x="6627205" y="1336508"/>
+            <a:ext cx="0" cy="817218"/>
+          </a:xfrm>
+          <a:prstGeom prst="line">
+            <a:avLst/>
+          </a:prstGeom>
+          <a:ln w="28575">
+            <a:solidFill>
+              <a:srgbClr val="00B0F0"/>
+            </a:solidFill>
+          </a:ln>
+        </p:spPr>
+        <p:style>
+          <a:lnRef idx="1">
+            <a:schemeClr val="accent1"/>
+          </a:lnRef>
+          <a:fillRef idx="0">
+            <a:schemeClr val="accent1"/>
+          </a:fillRef>
+          <a:effectRef idx="0">
+            <a:schemeClr val="accent1"/>
+          </a:effectRef>
+          <a:fontRef idx="minor">
+            <a:schemeClr val="tx1"/>
+          </a:fontRef>
+        </p:style>
+      </p:cxnSp>
+      <p:cxnSp>
+        <p:nvCxnSpPr>
+          <p:cNvPr id="105" name="Elbow Connector 104"/>
+          <p:cNvCxnSpPr/>
+          <p:nvPr/>
+        </p:nvCxnSpPr>
+        <p:spPr>
+          <a:xfrm>
+            <a:off x="152395" y="4805352"/>
+            <a:ext cx="6474809" cy="746559"/>
+          </a:xfrm>
+          <a:prstGeom prst="bentConnector3">
+            <a:avLst>
+              <a:gd name="adj1" fmla="val 116"/>
+            </a:avLst>
+          </a:prstGeom>
+          <a:ln w="28575">
+            <a:solidFill>
+              <a:srgbClr val="00B0F0"/>
+            </a:solidFill>
+          </a:ln>
+        </p:spPr>
+        <p:style>
+          <a:lnRef idx="1">
+            <a:schemeClr val="accent1"/>
+          </a:lnRef>
+          <a:fillRef idx="0">
+            <a:schemeClr val="accent1"/>
+          </a:fillRef>
+          <a:effectRef idx="0">
+            <a:schemeClr val="accent1"/>
+          </a:effectRef>
+          <a:fontRef idx="minor">
+            <a:schemeClr val="tx1"/>
+          </a:fontRef>
+        </p:style>
+      </p:cxnSp>
+      <p:cxnSp>
+        <p:nvCxnSpPr>
+          <p:cNvPr id="106" name="Straight Connector 105"/>
+          <p:cNvCxnSpPr/>
+          <p:nvPr/>
+        </p:nvCxnSpPr>
+        <p:spPr>
+          <a:xfrm flipV="1">
+            <a:off x="6627204" y="4749441"/>
+            <a:ext cx="0" cy="817218"/>
+          </a:xfrm>
+          <a:prstGeom prst="line">
+            <a:avLst/>
+          </a:prstGeom>
+          <a:ln w="28575">
+            <a:solidFill>
+              <a:srgbClr val="00B0F0"/>
+            </a:solidFill>
+          </a:ln>
+        </p:spPr>
+        <p:style>
+          <a:lnRef idx="1">
+            <a:schemeClr val="accent1"/>
+          </a:lnRef>
+          <a:fillRef idx="0">
+            <a:schemeClr val="accent1"/>
+          </a:fillRef>
+          <a:effectRef idx="0">
+            <a:schemeClr val="accent1"/>
+          </a:effectRef>
+          <a:fontRef idx="minor">
+            <a:schemeClr val="tx1"/>
+          </a:fontRef>
+        </p:style>
+      </p:cxnSp>
+      <p:sp>
+        <p:nvSpPr>
+          <p:cNvPr id="108" name="Rectangle 107"/>
+          <p:cNvSpPr/>
+          <p:nvPr/>
+        </p:nvSpPr>
+        <p:spPr>
+          <a:xfrm>
+            <a:off x="3419077" y="2261825"/>
+            <a:ext cx="1253786" cy="677739"/>
+          </a:xfrm>
+          <a:prstGeom prst="rect">
+            <a:avLst/>
+          </a:prstGeom>
+          <a:ln/>
+        </p:spPr>
+        <p:style>
+          <a:lnRef idx="2">
+            <a:schemeClr val="dk1"/>
+          </a:lnRef>
+          <a:fillRef idx="1">
+            <a:schemeClr val="lt1"/>
+          </a:fillRef>
+          <a:effectRef idx="0">
+            <a:schemeClr val="dk1"/>
+          </a:effectRef>
+          <a:fontRef idx="minor">
+            <a:schemeClr val="dk1"/>
+          </a:fontRef>
+        </p:style>
+        <p:txBody>
+          <a:bodyPr rtlCol="0" anchor="ctr"/>
+          <a:lstStyle/>
+          <a:p>
+            <a:pPr algn="ctr"/>
+            <a:r>
+              <a:rPr lang="en-US" sz="2800" dirty="0" smtClean="0">
+                <a:solidFill>
+                  <a:schemeClr val="tx1"/>
+                </a:solidFill>
+              </a:rPr>
+              <a:t>UDP</a:t>
+            </a:r>
+            <a:endParaRPr lang="en-US" sz="2800" dirty="0">
+              <a:solidFill>
+                <a:schemeClr val="tx1"/>
+              </a:solidFill>
+            </a:endParaRPr>
+          </a:p>
+        </p:txBody>
+      </p:sp>
+      <p:sp>
+        <p:nvSpPr>
+          <p:cNvPr id="109" name="Rectangle 108"/>
+          <p:cNvSpPr/>
+          <p:nvPr/>
+        </p:nvSpPr>
+        <p:spPr>
+          <a:xfrm>
+            <a:off x="5126691" y="1439346"/>
+            <a:ext cx="1253786" cy="677739"/>
+          </a:xfrm>
+          <a:prstGeom prst="rect">
+            <a:avLst/>
+          </a:prstGeom>
+          <a:ln/>
+        </p:spPr>
+        <p:style>
+          <a:lnRef idx="2">
+            <a:schemeClr val="dk1"/>
+          </a:lnRef>
+          <a:fillRef idx="1">
+            <a:schemeClr val="lt1"/>
+          </a:fillRef>
+          <a:effectRef idx="0">
+            <a:schemeClr val="dk1"/>
+          </a:effectRef>
+          <a:fontRef idx="minor">
+            <a:schemeClr val="dk1"/>
+          </a:fontRef>
+        </p:style>
+        <p:txBody>
+          <a:bodyPr rtlCol="0" anchor="ctr"/>
+          <a:lstStyle/>
+          <a:p>
+            <a:pPr algn="ctr"/>
+            <a:r>
+              <a:rPr lang="en-US" sz="2800" dirty="0" smtClean="0">
+                <a:solidFill>
+                  <a:schemeClr val="tx1"/>
+                </a:solidFill>
+              </a:rPr>
+              <a:t>IMAP</a:t>
+            </a:r>
+            <a:endParaRPr lang="en-US" sz="2800" dirty="0">
+              <a:solidFill>
+                <a:schemeClr val="tx1"/>
+              </a:solidFill>
+            </a:endParaRPr>
+          </a:p>
+        </p:txBody>
+      </p:sp>
+      <p:sp>
+        <p:nvSpPr>
+          <p:cNvPr id="110" name="Rectangle 109"/>
+          <p:cNvSpPr/>
+          <p:nvPr/>
+        </p:nvSpPr>
+        <p:spPr>
+          <a:xfrm>
+            <a:off x="3560204" y="1439346"/>
+            <a:ext cx="1253786" cy="677739"/>
+          </a:xfrm>
+          <a:prstGeom prst="rect">
+            <a:avLst/>
+          </a:prstGeom>
+          <a:ln/>
+        </p:spPr>
+        <p:style>
+          <a:lnRef idx="2">
+            <a:schemeClr val="dk1"/>
+          </a:lnRef>
+          <a:fillRef idx="1">
+            <a:schemeClr val="lt1"/>
+          </a:fillRef>
+          <a:effectRef idx="0">
+            <a:schemeClr val="dk1"/>
+          </a:effectRef>
+          <a:fontRef idx="minor">
+            <a:schemeClr val="dk1"/>
+          </a:fontRef>
+        </p:style>
+        <p:txBody>
+          <a:bodyPr rtlCol="0" anchor="ctr"/>
+          <a:lstStyle/>
+          <a:p>
+            <a:pPr algn="ctr"/>
+            <a:r>
+              <a:rPr lang="en-US" sz="2800" dirty="0" smtClean="0">
+                <a:solidFill>
+                  <a:schemeClr val="tx1"/>
+                </a:solidFill>
+              </a:rPr>
+              <a:t>DNS</a:t>
+            </a:r>
+            <a:endParaRPr lang="en-US" sz="2800" dirty="0">
+              <a:solidFill>
+                <a:schemeClr val="tx1"/>
+              </a:solidFill>
+            </a:endParaRPr>
+          </a:p>
+        </p:txBody>
+      </p:sp>
+      <p:sp>
+        <p:nvSpPr>
+          <p:cNvPr id="111" name="Rectangle 110"/>
+          <p:cNvSpPr/>
+          <p:nvPr/>
+        </p:nvSpPr>
+        <p:spPr>
+          <a:xfrm>
+            <a:off x="445918" y="1439346"/>
+            <a:ext cx="1253786" cy="677739"/>
+          </a:xfrm>
+          <a:prstGeom prst="rect">
+            <a:avLst/>
+          </a:prstGeom>
+          <a:ln/>
+        </p:spPr>
+        <p:style>
+          <a:lnRef idx="2">
+            <a:schemeClr val="dk1"/>
+          </a:lnRef>
+          <a:fillRef idx="1">
+            <a:schemeClr val="lt1"/>
+          </a:fillRef>
+          <a:effectRef idx="0">
+            <a:schemeClr val="dk1"/>
+          </a:effectRef>
+          <a:fontRef idx="minor">
+            <a:schemeClr val="dk1"/>
+          </a:fontRef>
+        </p:style>
+        <p:txBody>
+          <a:bodyPr rtlCol="0" anchor="ctr"/>
+          <a:lstStyle/>
+          <a:p>
+            <a:pPr algn="ctr"/>
+            <a:r>
+              <a:rPr lang="en-US" sz="2800" dirty="0" smtClean="0">
+                <a:solidFill>
+                  <a:schemeClr val="tx1"/>
+                </a:solidFill>
+              </a:rPr>
+              <a:t>HTTP</a:t>
+            </a:r>
+            <a:endParaRPr lang="en-US" sz="2800" dirty="0">
+              <a:solidFill>
+                <a:schemeClr val="tx1"/>
+              </a:solidFill>
+            </a:endParaRPr>
+          </a:p>
+        </p:txBody>
+      </p:sp>
+      <p:sp>
+        <p:nvSpPr>
+          <p:cNvPr id="112" name="Rectangle 111"/>
+          <p:cNvSpPr/>
+          <p:nvPr/>
+        </p:nvSpPr>
+        <p:spPr>
+          <a:xfrm>
+            <a:off x="1993100" y="1439346"/>
+            <a:ext cx="1253786" cy="677739"/>
+          </a:xfrm>
+          <a:prstGeom prst="rect">
+            <a:avLst/>
+          </a:prstGeom>
+          <a:ln/>
+        </p:spPr>
+        <p:style>
+          <a:lnRef idx="2">
+            <a:schemeClr val="dk1"/>
+          </a:lnRef>
+          <a:fillRef idx="1">
+            <a:schemeClr val="lt1"/>
+          </a:fillRef>
+          <a:effectRef idx="0">
+            <a:schemeClr val="dk1"/>
+          </a:effectRef>
+          <a:fontRef idx="minor">
+            <a:schemeClr val="dk1"/>
+          </a:fontRef>
+        </p:style>
+        <p:txBody>
+          <a:bodyPr rtlCol="0" anchor="ctr"/>
+          <a:lstStyle/>
+          <a:p>
+            <a:pPr algn="ctr"/>
+            <a:r>
+              <a:rPr lang="en-US" sz="2800" dirty="0" smtClean="0">
+                <a:solidFill>
+                  <a:schemeClr val="tx1"/>
+                </a:solidFill>
+              </a:rPr>
+              <a:t>SMTP</a:t>
+            </a:r>
+            <a:endParaRPr lang="en-US" sz="2800" dirty="0">
+              <a:solidFill>
+                <a:schemeClr val="tx1"/>
+              </a:solidFill>
+            </a:endParaRPr>
+          </a:p>
+        </p:txBody>
+      </p:sp>
+      <p:sp>
+        <p:nvSpPr>
+          <p:cNvPr id="119" name="Rectangle 118"/>
+          <p:cNvSpPr/>
+          <p:nvPr/>
+        </p:nvSpPr>
+        <p:spPr>
+          <a:xfrm>
+            <a:off x="5131611" y="4784542"/>
+            <a:ext cx="1253786" cy="677739"/>
+          </a:xfrm>
+          <a:prstGeom prst="rect">
+            <a:avLst/>
+          </a:prstGeom>
+          <a:ln/>
+        </p:spPr>
+        <p:style>
+          <a:lnRef idx="2">
+            <a:schemeClr val="dk1"/>
+          </a:lnRef>
+          <a:fillRef idx="1">
+            <a:schemeClr val="lt1"/>
+          </a:fillRef>
+          <a:effectRef idx="0">
+            <a:schemeClr val="dk1"/>
+          </a:effectRef>
+          <a:fontRef idx="minor">
+            <a:schemeClr val="dk1"/>
+          </a:fontRef>
+        </p:style>
+        <p:txBody>
+          <a:bodyPr rtlCol="0" anchor="ctr"/>
+          <a:lstStyle/>
+          <a:p>
+            <a:pPr algn="ctr"/>
+            <a:r>
+              <a:rPr lang="en-US" sz="2800" dirty="0" smtClean="0">
+                <a:solidFill>
+                  <a:schemeClr val="tx1"/>
+                </a:solidFill>
+              </a:rPr>
+              <a:t>SONET</a:t>
+            </a:r>
+            <a:endParaRPr lang="en-US" sz="2800" dirty="0">
+              <a:solidFill>
+                <a:schemeClr val="tx1"/>
+              </a:solidFill>
+            </a:endParaRPr>
+          </a:p>
+        </p:txBody>
+      </p:sp>
+      <p:sp>
+        <p:nvSpPr>
+          <p:cNvPr id="120" name="Rectangle 119"/>
+          <p:cNvSpPr/>
+          <p:nvPr/>
+        </p:nvSpPr>
+        <p:spPr>
+          <a:xfrm>
+            <a:off x="3567980" y="4784542"/>
+            <a:ext cx="1253786" cy="677739"/>
+          </a:xfrm>
+          <a:prstGeom prst="rect">
+            <a:avLst/>
+          </a:prstGeom>
+          <a:ln/>
+        </p:spPr>
+        <p:style>
+          <a:lnRef idx="2">
+            <a:schemeClr val="dk1"/>
+          </a:lnRef>
+          <a:fillRef idx="1">
+            <a:schemeClr val="lt1"/>
+          </a:fillRef>
+          <a:effectRef idx="0">
+            <a:schemeClr val="dk1"/>
+          </a:effectRef>
+          <a:fontRef idx="minor">
+            <a:schemeClr val="dk1"/>
+          </a:fontRef>
+        </p:style>
+        <p:txBody>
+          <a:bodyPr rtlCol="0" anchor="ctr"/>
+          <a:lstStyle/>
+          <a:p>
+            <a:pPr algn="ctr"/>
+            <a:r>
+              <a:rPr lang="en-US" sz="2800" dirty="0" smtClean="0">
+                <a:solidFill>
+                  <a:schemeClr val="tx1"/>
+                </a:solidFill>
+              </a:rPr>
+              <a:t>ATM</a:t>
+            </a:r>
+            <a:endParaRPr lang="en-US" sz="2800" dirty="0">
+              <a:solidFill>
+                <a:schemeClr val="tx1"/>
+              </a:solidFill>
+            </a:endParaRPr>
+          </a:p>
+        </p:txBody>
+      </p:sp>
+      <p:sp>
+        <p:nvSpPr>
+          <p:cNvPr id="121" name="Rectangle 120"/>
+          <p:cNvSpPr/>
+          <p:nvPr/>
+        </p:nvSpPr>
+        <p:spPr>
+          <a:xfrm>
+            <a:off x="445918" y="4784542"/>
+            <a:ext cx="1253786" cy="677739"/>
+          </a:xfrm>
+          <a:prstGeom prst="rect">
+            <a:avLst/>
+          </a:prstGeom>
+          <a:ln/>
+        </p:spPr>
+        <p:style>
+          <a:lnRef idx="2">
+            <a:schemeClr val="dk1"/>
+          </a:lnRef>
+          <a:fillRef idx="1">
+            <a:schemeClr val="lt1"/>
+          </a:fillRef>
+          <a:effectRef idx="0">
+            <a:schemeClr val="dk1"/>
+          </a:effectRef>
+          <a:fontRef idx="minor">
+            <a:schemeClr val="dk1"/>
+          </a:fontRef>
+        </p:style>
+        <p:txBody>
+          <a:bodyPr rtlCol="0" anchor="ctr"/>
+          <a:lstStyle/>
+          <a:p>
+            <a:pPr algn="ctr"/>
+            <a:r>
+              <a:rPr lang="en-US" sz="2800" dirty="0" smtClean="0">
+                <a:solidFill>
+                  <a:schemeClr val="tx1"/>
+                </a:solidFill>
+              </a:rPr>
+              <a:t>802.11</a:t>
+            </a:r>
+            <a:endParaRPr lang="en-US" sz="2800" dirty="0">
+              <a:solidFill>
+                <a:schemeClr val="tx1"/>
+              </a:solidFill>
+            </a:endParaRPr>
+          </a:p>
+        </p:txBody>
+      </p:sp>
+      <p:sp>
+        <p:nvSpPr>
+          <p:cNvPr id="122" name="Rectangle 121"/>
+          <p:cNvSpPr/>
+          <p:nvPr/>
+        </p:nvSpPr>
+        <p:spPr>
+          <a:xfrm>
+            <a:off x="1998020" y="4784542"/>
+            <a:ext cx="1253786" cy="677739"/>
+          </a:xfrm>
+          <a:prstGeom prst="rect">
+            <a:avLst/>
+          </a:prstGeom>
+          <a:ln/>
+        </p:spPr>
+        <p:style>
+          <a:lnRef idx="2">
+            <a:schemeClr val="dk1"/>
+          </a:lnRef>
+          <a:fillRef idx="1">
+            <a:schemeClr val="lt1"/>
+          </a:fillRef>
+          <a:effectRef idx="0">
+            <a:schemeClr val="dk1"/>
+          </a:effectRef>
+          <a:fontRef idx="minor">
+            <a:schemeClr val="dk1"/>
+          </a:fontRef>
+        </p:style>
+        <p:txBody>
+          <a:bodyPr rtlCol="0" anchor="ctr"/>
+          <a:lstStyle/>
+          <a:p>
+            <a:pPr algn="ctr"/>
+            <a:r>
+              <a:rPr lang="en-US" sz="2800" dirty="0" smtClean="0">
+                <a:solidFill>
+                  <a:schemeClr val="tx1"/>
+                </a:solidFill>
+              </a:rPr>
+              <a:t>PPP</a:t>
+            </a:r>
+            <a:endParaRPr lang="en-US" sz="2800" dirty="0">
+              <a:solidFill>
+                <a:schemeClr val="tx1"/>
+              </a:solidFill>
+            </a:endParaRPr>
+          </a:p>
+        </p:txBody>
+      </p:sp>
+    </p:spTree>
+    <p:extLst>
+      <p:ext uri="{BB962C8B-B14F-4D97-AF65-F5344CB8AC3E}">
+        <p14:creationId xmlns:p14="http://schemas.microsoft.com/office/powerpoint/2010/main" val="1867893802"/>
+      </p:ext>
+    </p:extLst>
+  </p:cSld>
+  <p:clrMapOvr>
+    <a:masterClrMapping/>
+  </p:clrMapOvr>
+  <p:timing>
+    <p:tnLst>
+      <p:par>
+        <p:cTn id="1" dur="indefinite" restart="never" nodeType="tmRoot"/>
+      </p:par>
+    </p:tnLst>
+  </p:timing>
+</p:sld>
+</file>
+
+<file path=ppt/slides/slide4.xml><?xml version="1.0" encoding="utf-8"?>
+<p:sld xmlns:a="http://schemas.openxmlformats.org/drawingml/2006/main" xmlns:r="http://schemas.openxmlformats.org/officeDocument/2006/relationships" xmlns:p="http://schemas.openxmlformats.org/presentationml/2006/main">
+  <p:cSld>
+    <p:spTree>
+      <p:nvGrpSpPr>
+        <p:cNvPr id="1" name=""/>
+        <p:cNvGrpSpPr/>
+        <p:nvPr/>
+      </p:nvGrpSpPr>
+      <p:grpSpPr>
+        <a:xfrm>
+          <a:off x="0" y="0"/>
+          <a:ext cx="0" cy="0"/>
+          <a:chOff x="0" y="0"/>
+          <a:chExt cx="0" cy="0"/>
+        </a:xfrm>
+      </p:grpSpPr>
+      <p:pic>
+        <p:nvPicPr>
+          <p:cNvPr id="45" name="Picture 44"/>
+          <p:cNvPicPr>
+            <a:picLocks noChangeAspect="1"/>
+          </p:cNvPicPr>
+          <p:nvPr/>
+        </p:nvPicPr>
+        <p:blipFill>
+          <a:blip r:embed="rId2">
+            <a:extLst>
+              <a:ext uri="{28A0092B-C50C-407E-A947-70E740481C1C}">
+                <a14:useLocalDpi xmlns:a14="http://schemas.microsoft.com/office/drawing/2010/main" val="0"/>
+              </a:ext>
+            </a:extLst>
+          </a:blip>
+          <a:stretch>
+            <a:fillRect/>
+          </a:stretch>
+        </p:blipFill>
+        <p:spPr>
+          <a:xfrm>
+            <a:off x="1431830" y="1150388"/>
+            <a:ext cx="1199438" cy="846911"/>
+          </a:xfrm>
+          <a:prstGeom prst="rect">
+            <a:avLst/>
+          </a:prstGeom>
+        </p:spPr>
+      </p:pic>
+      <p:sp>
+        <p:nvSpPr>
+          <p:cNvPr id="46" name="Can 45"/>
+          <p:cNvSpPr/>
+          <p:nvPr/>
+        </p:nvSpPr>
+        <p:spPr>
+          <a:xfrm>
+            <a:off x="4992107" y="2896329"/>
+            <a:ext cx="3274142" cy="2143658"/>
+          </a:xfrm>
+          <a:prstGeom prst="can">
+            <a:avLst/>
+          </a:prstGeom>
+          <a:ln w="28575">
+            <a:solidFill>
+              <a:srgbClr val="00B0F0"/>
+            </a:solidFill>
+          </a:ln>
+        </p:spPr>
+        <p:style>
+          <a:lnRef idx="2">
+            <a:schemeClr val="accent1"/>
+          </a:lnRef>
+          <a:fillRef idx="1">
+            <a:schemeClr val="lt1"/>
+          </a:fillRef>
+          <a:effectRef idx="0">
+            <a:schemeClr val="accent1"/>
+          </a:effectRef>
+          <a:fontRef idx="minor">
+            <a:schemeClr val="dk1"/>
+          </a:fontRef>
+        </p:style>
+        <p:txBody>
+          <a:bodyPr rtlCol="0" anchor="ctr"/>
+          <a:lstStyle/>
+          <a:p>
+            <a:pPr algn="ctr"/>
+            <a:endParaRPr lang="en-US"/>
+          </a:p>
+        </p:txBody>
+      </p:sp>
+      <p:sp>
+        <p:nvSpPr>
+          <p:cNvPr id="47" name="TextBox 46"/>
+          <p:cNvSpPr txBox="1"/>
+          <p:nvPr/>
+        </p:nvSpPr>
+        <p:spPr>
+          <a:xfrm>
+            <a:off x="5833315" y="2939065"/>
+            <a:ext cx="1593513" cy="400110"/>
+          </a:xfrm>
+          <a:prstGeom prst="rect">
+            <a:avLst/>
+          </a:prstGeom>
+          <a:noFill/>
+        </p:spPr>
+        <p:txBody>
+          <a:bodyPr wrap="none" rtlCol="0">
+            <a:spAutoFit/>
+          </a:bodyPr>
+          <a:lstStyle/>
+          <a:p>
+            <a:pPr algn="ctr"/>
+            <a:r>
+              <a:rPr lang="en-US" dirty="0" smtClean="0"/>
+              <a:t>Blo</a:t>
+            </a:r>
+            <a:r>
+              <a:rPr lang="en-US" sz="2000" dirty="0" smtClean="0"/>
+              <a:t>ckstack DB</a:t>
+            </a:r>
+          </a:p>
+        </p:txBody>
+      </p:sp>
+      <p:grpSp>
+        <p:nvGrpSpPr>
+          <p:cNvPr id="48" name="Group 47"/>
+          <p:cNvGrpSpPr/>
+          <p:nvPr/>
+        </p:nvGrpSpPr>
+        <p:grpSpPr>
+          <a:xfrm>
+            <a:off x="5211032" y="3471922"/>
+            <a:ext cx="828212" cy="1305857"/>
+            <a:chOff x="4186239" y="3607814"/>
+            <a:chExt cx="828212" cy="1305857"/>
+          </a:xfrm>
+        </p:grpSpPr>
+        <p:sp>
+          <p:nvSpPr>
+            <p:cNvPr id="49" name="Rectangle 48"/>
+            <p:cNvSpPr/>
+            <p:nvPr/>
+          </p:nvSpPr>
+          <p:spPr>
+            <a:xfrm>
+              <a:off x="4186239" y="3975032"/>
+              <a:ext cx="828212" cy="265129"/>
+            </a:xfrm>
+            <a:prstGeom prst="rect">
+              <a:avLst/>
+            </a:prstGeom>
+            <a:solidFill>
+              <a:srgbClr val="CFE7F1"/>
+            </a:solidFill>
+            <a:ln w="19050">
+              <a:solidFill>
+                <a:srgbClr val="00B0F0"/>
+              </a:solidFill>
+            </a:ln>
+          </p:spPr>
+          <p:style>
+            <a:lnRef idx="2">
+              <a:schemeClr val="accent1">
+                <a:shade val="50000"/>
+              </a:schemeClr>
+            </a:lnRef>
+            <a:fillRef idx="1">
+              <a:schemeClr val="accent1"/>
+            </a:fillRef>
+            <a:effectRef idx="0">
+              <a:schemeClr val="accent1"/>
+            </a:effectRef>
+            <a:fontRef idx="minor">
+              <a:schemeClr val="lt1"/>
+            </a:fontRef>
+          </p:style>
+          <p:txBody>
+            <a:bodyPr rtlCol="0" anchor="ctr"/>
+            <a:lstStyle/>
+            <a:p>
+              <a:pPr algn="ctr"/>
+              <a:endParaRPr lang="en-US" sz="2800" dirty="0">
+                <a:solidFill>
+                  <a:schemeClr val="tx1"/>
+                </a:solidFill>
+              </a:endParaRPr>
+            </a:p>
+          </p:txBody>
+        </p:sp>
+        <p:sp>
+          <p:nvSpPr>
+            <p:cNvPr id="50" name="Rectangle 49"/>
+            <p:cNvSpPr/>
+            <p:nvPr/>
+          </p:nvSpPr>
+          <p:spPr>
+            <a:xfrm>
+              <a:off x="4186239" y="4311787"/>
+              <a:ext cx="828212" cy="265129"/>
+            </a:xfrm>
+            <a:prstGeom prst="rect">
+              <a:avLst/>
+            </a:prstGeom>
+            <a:solidFill>
+              <a:srgbClr val="CFE7F1"/>
+            </a:solidFill>
+            <a:ln w="19050">
+              <a:solidFill>
+                <a:srgbClr val="00B0F0"/>
+              </a:solidFill>
+            </a:ln>
+          </p:spPr>
+          <p:style>
+            <a:lnRef idx="2">
+              <a:schemeClr val="accent1">
+                <a:shade val="50000"/>
+              </a:schemeClr>
+            </a:lnRef>
+            <a:fillRef idx="1">
+              <a:schemeClr val="accent1"/>
+            </a:fillRef>
+            <a:effectRef idx="0">
+              <a:schemeClr val="accent1"/>
+            </a:effectRef>
+            <a:fontRef idx="minor">
+              <a:schemeClr val="lt1"/>
+            </a:fontRef>
+          </p:style>
+          <p:txBody>
+            <a:bodyPr rtlCol="0" anchor="ctr"/>
+            <a:lstStyle/>
+            <a:p>
+              <a:pPr algn="ctr"/>
+              <a:endParaRPr lang="en-US" sz="2800" dirty="0">
+                <a:solidFill>
+                  <a:schemeClr val="tx1"/>
+                </a:solidFill>
+              </a:endParaRPr>
+            </a:p>
+          </p:txBody>
+        </p:sp>
+        <p:sp>
+          <p:nvSpPr>
+            <p:cNvPr id="51" name="Rectangle 50"/>
+            <p:cNvSpPr/>
+            <p:nvPr/>
+          </p:nvSpPr>
+          <p:spPr>
+            <a:xfrm>
+              <a:off x="4186239" y="4648542"/>
+              <a:ext cx="828212" cy="265129"/>
+            </a:xfrm>
+            <a:prstGeom prst="rect">
+              <a:avLst/>
+            </a:prstGeom>
+            <a:solidFill>
+              <a:srgbClr val="CFE7F1"/>
+            </a:solidFill>
+            <a:ln w="19050">
+              <a:solidFill>
+                <a:srgbClr val="00B0F0"/>
+              </a:solidFill>
+            </a:ln>
+          </p:spPr>
+          <p:style>
+            <a:lnRef idx="2">
+              <a:schemeClr val="accent1">
+                <a:shade val="50000"/>
+              </a:schemeClr>
+            </a:lnRef>
+            <a:fillRef idx="1">
+              <a:schemeClr val="accent1"/>
+            </a:fillRef>
+            <a:effectRef idx="0">
+              <a:schemeClr val="accent1"/>
+            </a:effectRef>
+            <a:fontRef idx="minor">
+              <a:schemeClr val="lt1"/>
+            </a:fontRef>
+          </p:style>
+          <p:txBody>
+            <a:bodyPr rtlCol="0" anchor="ctr"/>
+            <a:lstStyle/>
+            <a:p>
+              <a:pPr algn="ctr"/>
+              <a:endParaRPr lang="en-US" sz="2800" dirty="0">
+                <a:solidFill>
+                  <a:schemeClr val="tx1"/>
+                </a:solidFill>
+              </a:endParaRPr>
+            </a:p>
+          </p:txBody>
+        </p:sp>
+        <p:sp>
+          <p:nvSpPr>
+            <p:cNvPr id="52" name="TextBox 51"/>
+            <p:cNvSpPr txBox="1"/>
+            <p:nvPr/>
+          </p:nvSpPr>
+          <p:spPr>
+            <a:xfrm>
+              <a:off x="4228288" y="3607814"/>
+              <a:ext cx="744114" cy="369332"/>
+            </a:xfrm>
+            <a:prstGeom prst="rect">
+              <a:avLst/>
+            </a:prstGeom>
+            <a:noFill/>
+          </p:spPr>
+          <p:txBody>
+            <a:bodyPr wrap="none" rtlCol="0">
+              <a:spAutoFit/>
+            </a:bodyPr>
+            <a:lstStyle/>
+            <a:p>
+              <a:pPr algn="ctr"/>
+              <a:r>
+                <a:rPr lang="en-US" dirty="0" smtClean="0"/>
+                <a:t>Name</a:t>
+              </a:r>
+              <a:endParaRPr lang="en-US" dirty="0"/>
+            </a:p>
+          </p:txBody>
+        </p:sp>
+      </p:grpSp>
+      <p:grpSp>
+        <p:nvGrpSpPr>
+          <p:cNvPr id="53" name="Group 52"/>
+          <p:cNvGrpSpPr/>
+          <p:nvPr/>
+        </p:nvGrpSpPr>
+        <p:grpSpPr>
+          <a:xfrm>
+            <a:off x="6215966" y="3471922"/>
+            <a:ext cx="828212" cy="1305857"/>
+            <a:chOff x="4186239" y="3607814"/>
+            <a:chExt cx="828212" cy="1305857"/>
+          </a:xfrm>
+        </p:grpSpPr>
+        <p:sp>
+          <p:nvSpPr>
+            <p:cNvPr id="54" name="Rectangle 53"/>
+            <p:cNvSpPr/>
+            <p:nvPr/>
+          </p:nvSpPr>
+          <p:spPr>
+            <a:xfrm>
+              <a:off x="4186239" y="3975032"/>
+              <a:ext cx="828212" cy="265129"/>
+            </a:xfrm>
+            <a:prstGeom prst="rect">
+              <a:avLst/>
+            </a:prstGeom>
+            <a:solidFill>
+              <a:srgbClr val="CFE7F1"/>
+            </a:solidFill>
+            <a:ln w="19050">
+              <a:solidFill>
+                <a:srgbClr val="00B0F0"/>
+              </a:solidFill>
+            </a:ln>
+          </p:spPr>
+          <p:style>
+            <a:lnRef idx="2">
+              <a:schemeClr val="accent1">
+                <a:shade val="50000"/>
+              </a:schemeClr>
+            </a:lnRef>
+            <a:fillRef idx="1">
+              <a:schemeClr val="accent1"/>
+            </a:fillRef>
+            <a:effectRef idx="0">
+              <a:schemeClr val="accent1"/>
+            </a:effectRef>
+            <a:fontRef idx="minor">
+              <a:schemeClr val="lt1"/>
+            </a:fontRef>
+          </p:style>
+          <p:txBody>
+            <a:bodyPr rtlCol="0" anchor="ctr"/>
+            <a:lstStyle/>
+            <a:p>
+              <a:pPr algn="ctr"/>
+              <a:endParaRPr lang="en-US" sz="2800" dirty="0">
+                <a:solidFill>
+                  <a:schemeClr val="tx1"/>
+                </a:solidFill>
+              </a:endParaRPr>
+            </a:p>
+          </p:txBody>
+        </p:sp>
+        <p:sp>
+          <p:nvSpPr>
+            <p:cNvPr id="55" name="Rectangle 54"/>
+            <p:cNvSpPr/>
+            <p:nvPr/>
+          </p:nvSpPr>
+          <p:spPr>
+            <a:xfrm>
+              <a:off x="4186239" y="4311787"/>
+              <a:ext cx="828212" cy="265129"/>
+            </a:xfrm>
+            <a:prstGeom prst="rect">
+              <a:avLst/>
+            </a:prstGeom>
+            <a:solidFill>
+              <a:srgbClr val="CFE7F1"/>
+            </a:solidFill>
+            <a:ln w="19050">
+              <a:solidFill>
+                <a:srgbClr val="00B0F0"/>
+              </a:solidFill>
+            </a:ln>
+          </p:spPr>
+          <p:style>
+            <a:lnRef idx="2">
+              <a:schemeClr val="accent1">
+                <a:shade val="50000"/>
+              </a:schemeClr>
+            </a:lnRef>
+            <a:fillRef idx="1">
+              <a:schemeClr val="accent1"/>
+            </a:fillRef>
+            <a:effectRef idx="0">
+              <a:schemeClr val="accent1"/>
+            </a:effectRef>
+            <a:fontRef idx="minor">
+              <a:schemeClr val="lt1"/>
+            </a:fontRef>
+          </p:style>
+          <p:txBody>
+            <a:bodyPr rtlCol="0" anchor="ctr"/>
+            <a:lstStyle/>
+            <a:p>
+              <a:pPr algn="ctr"/>
+              <a:endParaRPr lang="en-US" sz="2800" dirty="0">
+                <a:solidFill>
+                  <a:schemeClr val="tx1"/>
+                </a:solidFill>
+              </a:endParaRPr>
+            </a:p>
+          </p:txBody>
+        </p:sp>
+        <p:sp>
+          <p:nvSpPr>
+            <p:cNvPr id="56" name="Rectangle 55"/>
+            <p:cNvSpPr/>
+            <p:nvPr/>
+          </p:nvSpPr>
+          <p:spPr>
+            <a:xfrm>
+              <a:off x="4186239" y="4648542"/>
+              <a:ext cx="828212" cy="265129"/>
+            </a:xfrm>
+            <a:prstGeom prst="rect">
+              <a:avLst/>
+            </a:prstGeom>
+            <a:solidFill>
+              <a:srgbClr val="CFE7F1"/>
+            </a:solidFill>
+            <a:ln w="19050">
+              <a:solidFill>
+                <a:srgbClr val="00B0F0"/>
+              </a:solidFill>
+            </a:ln>
+          </p:spPr>
+          <p:style>
+            <a:lnRef idx="2">
+              <a:schemeClr val="accent1">
+                <a:shade val="50000"/>
+              </a:schemeClr>
+            </a:lnRef>
+            <a:fillRef idx="1">
+              <a:schemeClr val="accent1"/>
+            </a:fillRef>
+            <a:effectRef idx="0">
+              <a:schemeClr val="accent1"/>
+            </a:effectRef>
+            <a:fontRef idx="minor">
+              <a:schemeClr val="lt1"/>
+            </a:fontRef>
+          </p:style>
+          <p:txBody>
+            <a:bodyPr rtlCol="0" anchor="ctr"/>
+            <a:lstStyle/>
+            <a:p>
+              <a:pPr algn="ctr"/>
+              <a:endParaRPr lang="en-US" sz="2800" dirty="0">
+                <a:solidFill>
+                  <a:schemeClr val="tx1"/>
+                </a:solidFill>
+              </a:endParaRPr>
+            </a:p>
+          </p:txBody>
+        </p:sp>
+        <p:sp>
+          <p:nvSpPr>
+            <p:cNvPr id="57" name="TextBox 56"/>
+            <p:cNvSpPr txBox="1"/>
+            <p:nvPr/>
+          </p:nvSpPr>
+          <p:spPr>
+            <a:xfrm>
+              <a:off x="4225082" y="3607814"/>
+              <a:ext cx="750526" cy="369332"/>
+            </a:xfrm>
+            <a:prstGeom prst="rect">
+              <a:avLst/>
+            </a:prstGeom>
+            <a:noFill/>
+          </p:spPr>
+          <p:txBody>
+            <a:bodyPr wrap="none" rtlCol="0">
+              <a:spAutoFit/>
+            </a:bodyPr>
+            <a:lstStyle/>
+            <a:p>
+              <a:pPr algn="ctr"/>
+              <a:r>
+                <a:rPr lang="en-US" dirty="0" smtClean="0"/>
+                <a:t>Public</a:t>
+              </a:r>
+              <a:endParaRPr lang="en-US" dirty="0"/>
+            </a:p>
+          </p:txBody>
+        </p:sp>
+      </p:grpSp>
+      <p:grpSp>
+        <p:nvGrpSpPr>
+          <p:cNvPr id="58" name="Group 57"/>
+          <p:cNvGrpSpPr/>
+          <p:nvPr/>
+        </p:nvGrpSpPr>
+        <p:grpSpPr>
+          <a:xfrm>
+            <a:off x="7233454" y="3451340"/>
+            <a:ext cx="828212" cy="1305857"/>
+            <a:chOff x="4186239" y="3607814"/>
+            <a:chExt cx="828212" cy="1305857"/>
+          </a:xfrm>
+        </p:grpSpPr>
+        <p:sp>
+          <p:nvSpPr>
+            <p:cNvPr id="59" name="Rectangle 58"/>
+            <p:cNvSpPr/>
+            <p:nvPr/>
+          </p:nvSpPr>
+          <p:spPr>
+            <a:xfrm>
+              <a:off x="4186239" y="3975032"/>
+              <a:ext cx="828212" cy="265129"/>
+            </a:xfrm>
+            <a:prstGeom prst="rect">
+              <a:avLst/>
+            </a:prstGeom>
+            <a:solidFill>
+              <a:srgbClr val="CFE7F1"/>
+            </a:solidFill>
+            <a:ln w="19050">
+              <a:solidFill>
+                <a:srgbClr val="00B0F0"/>
+              </a:solidFill>
+            </a:ln>
+          </p:spPr>
+          <p:style>
+            <a:lnRef idx="2">
+              <a:schemeClr val="accent1">
+                <a:shade val="50000"/>
+              </a:schemeClr>
+            </a:lnRef>
+            <a:fillRef idx="1">
+              <a:schemeClr val="accent1"/>
+            </a:fillRef>
+            <a:effectRef idx="0">
+              <a:schemeClr val="accent1"/>
+            </a:effectRef>
+            <a:fontRef idx="minor">
+              <a:schemeClr val="lt1"/>
+            </a:fontRef>
+          </p:style>
+          <p:txBody>
+            <a:bodyPr rtlCol="0" anchor="ctr"/>
+            <a:lstStyle/>
+            <a:p>
+              <a:pPr algn="ctr"/>
+              <a:endParaRPr lang="en-US" sz="2800" dirty="0">
+                <a:solidFill>
+                  <a:schemeClr val="tx1"/>
+                </a:solidFill>
+              </a:endParaRPr>
+            </a:p>
+          </p:txBody>
+        </p:sp>
+        <p:sp>
+          <p:nvSpPr>
+            <p:cNvPr id="60" name="Rectangle 59"/>
+            <p:cNvSpPr/>
+            <p:nvPr/>
+          </p:nvSpPr>
+          <p:spPr>
+            <a:xfrm>
+              <a:off x="4186239" y="4311787"/>
+              <a:ext cx="828212" cy="265129"/>
+            </a:xfrm>
+            <a:prstGeom prst="rect">
+              <a:avLst/>
+            </a:prstGeom>
+            <a:solidFill>
+              <a:srgbClr val="CFE7F1"/>
+            </a:solidFill>
+            <a:ln w="19050">
+              <a:solidFill>
+                <a:srgbClr val="00B0F0"/>
+              </a:solidFill>
+            </a:ln>
+          </p:spPr>
+          <p:style>
+            <a:lnRef idx="2">
+              <a:schemeClr val="accent1">
+                <a:shade val="50000"/>
+              </a:schemeClr>
+            </a:lnRef>
+            <a:fillRef idx="1">
+              <a:schemeClr val="accent1"/>
+            </a:fillRef>
+            <a:effectRef idx="0">
+              <a:schemeClr val="accent1"/>
+            </a:effectRef>
+            <a:fontRef idx="minor">
+              <a:schemeClr val="lt1"/>
+            </a:fontRef>
+          </p:style>
+          <p:txBody>
+            <a:bodyPr rtlCol="0" anchor="ctr"/>
+            <a:lstStyle/>
+            <a:p>
+              <a:pPr algn="ctr"/>
+              <a:endParaRPr lang="en-US" sz="2800" dirty="0">
+                <a:solidFill>
+                  <a:schemeClr val="tx1"/>
+                </a:solidFill>
+              </a:endParaRPr>
+            </a:p>
+          </p:txBody>
+        </p:sp>
+        <p:sp>
+          <p:nvSpPr>
+            <p:cNvPr id="61" name="Rectangle 60"/>
+            <p:cNvSpPr/>
+            <p:nvPr/>
+          </p:nvSpPr>
+          <p:spPr>
+            <a:xfrm>
+              <a:off x="4186239" y="4648542"/>
+              <a:ext cx="828212" cy="265129"/>
+            </a:xfrm>
+            <a:prstGeom prst="rect">
+              <a:avLst/>
+            </a:prstGeom>
+            <a:solidFill>
+              <a:srgbClr val="CFE7F1"/>
+            </a:solidFill>
+            <a:ln w="19050">
+              <a:solidFill>
+                <a:srgbClr val="00B0F0"/>
+              </a:solidFill>
+            </a:ln>
+          </p:spPr>
+          <p:style>
+            <a:lnRef idx="2">
+              <a:schemeClr val="accent1">
+                <a:shade val="50000"/>
+              </a:schemeClr>
+            </a:lnRef>
+            <a:fillRef idx="1">
+              <a:schemeClr val="accent1"/>
+            </a:fillRef>
+            <a:effectRef idx="0">
+              <a:schemeClr val="accent1"/>
+            </a:effectRef>
+            <a:fontRef idx="minor">
+              <a:schemeClr val="lt1"/>
+            </a:fontRef>
+          </p:style>
+          <p:txBody>
+            <a:bodyPr rtlCol="0" anchor="ctr"/>
+            <a:lstStyle/>
+            <a:p>
+              <a:pPr algn="ctr"/>
+              <a:endParaRPr lang="en-US" sz="2800" dirty="0">
+                <a:solidFill>
+                  <a:schemeClr val="tx1"/>
+                </a:solidFill>
+              </a:endParaRPr>
+            </a:p>
+          </p:txBody>
+        </p:sp>
+        <p:sp>
+          <p:nvSpPr>
+            <p:cNvPr id="62" name="TextBox 61"/>
+            <p:cNvSpPr txBox="1"/>
+            <p:nvPr/>
+          </p:nvSpPr>
+          <p:spPr>
+            <a:xfrm>
+              <a:off x="4230949" y="3607814"/>
+              <a:ext cx="738792" cy="369332"/>
+            </a:xfrm>
+            <a:prstGeom prst="rect">
+              <a:avLst/>
+            </a:prstGeom>
+            <a:noFill/>
+          </p:spPr>
+          <p:txBody>
+            <a:bodyPr wrap="none" rtlCol="0">
+              <a:spAutoFit/>
+            </a:bodyPr>
+            <a:lstStyle/>
+            <a:p>
+              <a:pPr algn="ctr"/>
+              <a:r>
+                <a:rPr lang="en-US" dirty="0" smtClean="0"/>
+                <a:t>Route</a:t>
+              </a:r>
+              <a:endParaRPr lang="en-US" dirty="0"/>
+            </a:p>
+          </p:txBody>
+        </p:sp>
+      </p:grpSp>
+      <p:sp>
+        <p:nvSpPr>
+          <p:cNvPr id="63" name="Rectangle 62"/>
+          <p:cNvSpPr/>
+          <p:nvPr/>
+        </p:nvSpPr>
+        <p:spPr>
+          <a:xfrm>
+            <a:off x="1803056" y="5517536"/>
+            <a:ext cx="828212" cy="768227"/>
+          </a:xfrm>
+          <a:prstGeom prst="rect">
+            <a:avLst/>
+          </a:prstGeom>
+          <a:solidFill>
+            <a:srgbClr val="CFE7F1"/>
+          </a:solidFill>
+          <a:ln w="19050">
+            <a:noFill/>
+          </a:ln>
+        </p:spPr>
+        <p:style>
+          <a:lnRef idx="2">
+            <a:schemeClr val="accent1">
+              <a:shade val="50000"/>
+            </a:schemeClr>
+          </a:lnRef>
+          <a:fillRef idx="1">
+            <a:schemeClr val="accent1"/>
+          </a:fillRef>
+          <a:effectRef idx="0">
+            <a:schemeClr val="accent1"/>
+          </a:effectRef>
+          <a:fontRef idx="minor">
+            <a:schemeClr val="lt1"/>
+          </a:fontRef>
+        </p:style>
+        <p:txBody>
+          <a:bodyPr rtlCol="0" anchor="ctr"/>
+          <a:lstStyle/>
+          <a:p>
+            <a:pPr algn="ctr"/>
+            <a:endParaRPr lang="en-US" sz="2800" dirty="0">
+              <a:solidFill>
+                <a:schemeClr val="tx1"/>
+              </a:solidFill>
+            </a:endParaRPr>
+          </a:p>
+        </p:txBody>
+      </p:sp>
+      <p:sp>
+        <p:nvSpPr>
+          <p:cNvPr id="64" name="Rectangle 63"/>
+          <p:cNvSpPr/>
+          <p:nvPr/>
+        </p:nvSpPr>
+        <p:spPr>
+          <a:xfrm>
+            <a:off x="2972513" y="5517537"/>
+            <a:ext cx="828212" cy="768227"/>
+          </a:xfrm>
+          <a:prstGeom prst="rect">
+            <a:avLst/>
+          </a:prstGeom>
+          <a:solidFill>
+            <a:srgbClr val="CFE7F1"/>
+          </a:solidFill>
+          <a:ln w="19050">
+            <a:noFill/>
+          </a:ln>
+        </p:spPr>
+        <p:style>
+          <a:lnRef idx="2">
+            <a:schemeClr val="accent1">
+              <a:shade val="50000"/>
+            </a:schemeClr>
+          </a:lnRef>
+          <a:fillRef idx="1">
+            <a:schemeClr val="accent1"/>
+          </a:fillRef>
+          <a:effectRef idx="0">
+            <a:schemeClr val="accent1"/>
+          </a:effectRef>
+          <a:fontRef idx="minor">
+            <a:schemeClr val="lt1"/>
+          </a:fontRef>
+        </p:style>
+        <p:txBody>
+          <a:bodyPr rtlCol="0" anchor="ctr"/>
+          <a:lstStyle/>
+          <a:p>
+            <a:pPr algn="ctr"/>
+            <a:endParaRPr lang="en-US" sz="2800" dirty="0">
+              <a:solidFill>
+                <a:schemeClr val="tx1"/>
+              </a:solidFill>
+            </a:endParaRPr>
+          </a:p>
+        </p:txBody>
+      </p:sp>
+      <p:sp>
+        <p:nvSpPr>
+          <p:cNvPr id="65" name="Rectangle 64"/>
+          <p:cNvSpPr/>
+          <p:nvPr/>
+        </p:nvSpPr>
+        <p:spPr>
+          <a:xfrm>
+            <a:off x="4141970" y="5545886"/>
+            <a:ext cx="828212" cy="768227"/>
+          </a:xfrm>
+          <a:prstGeom prst="rect">
+            <a:avLst/>
+          </a:prstGeom>
+          <a:solidFill>
+            <a:srgbClr val="CFE7F1"/>
+          </a:solidFill>
+          <a:ln w="19050">
+            <a:noFill/>
+          </a:ln>
+        </p:spPr>
+        <p:style>
+          <a:lnRef idx="2">
+            <a:schemeClr val="accent1">
+              <a:shade val="50000"/>
+            </a:schemeClr>
+          </a:lnRef>
+          <a:fillRef idx="1">
+            <a:schemeClr val="accent1"/>
+          </a:fillRef>
+          <a:effectRef idx="0">
+            <a:schemeClr val="accent1"/>
+          </a:effectRef>
+          <a:fontRef idx="minor">
+            <a:schemeClr val="lt1"/>
+          </a:fontRef>
+        </p:style>
+        <p:txBody>
+          <a:bodyPr rtlCol="0" anchor="ctr"/>
+          <a:lstStyle/>
+          <a:p>
+            <a:pPr algn="ctr"/>
+            <a:endParaRPr lang="en-US" sz="2800" dirty="0">
+              <a:solidFill>
+                <a:schemeClr val="tx1"/>
+              </a:solidFill>
+            </a:endParaRPr>
+          </a:p>
+        </p:txBody>
+      </p:sp>
+      <p:sp>
+        <p:nvSpPr>
+          <p:cNvPr id="66" name="Rectangle 65"/>
+          <p:cNvSpPr/>
+          <p:nvPr/>
+        </p:nvSpPr>
+        <p:spPr>
+          <a:xfrm>
+            <a:off x="5229598" y="5549000"/>
+            <a:ext cx="828212" cy="768227"/>
+          </a:xfrm>
+          <a:prstGeom prst="rect">
+            <a:avLst/>
+          </a:prstGeom>
+          <a:solidFill>
+            <a:srgbClr val="CFE7F1"/>
+          </a:solidFill>
+          <a:ln w="19050">
+            <a:noFill/>
+          </a:ln>
+        </p:spPr>
+        <p:style>
+          <a:lnRef idx="2">
+            <a:schemeClr val="accent1">
+              <a:shade val="50000"/>
+            </a:schemeClr>
+          </a:lnRef>
+          <a:fillRef idx="1">
+            <a:schemeClr val="accent1"/>
+          </a:fillRef>
+          <a:effectRef idx="0">
+            <a:schemeClr val="accent1"/>
+          </a:effectRef>
+          <a:fontRef idx="minor">
+            <a:schemeClr val="lt1"/>
+          </a:fontRef>
+        </p:style>
+        <p:txBody>
+          <a:bodyPr rtlCol="0" anchor="ctr"/>
+          <a:lstStyle/>
+          <a:p>
+            <a:pPr algn="ctr"/>
+            <a:endParaRPr lang="en-US" sz="2800" dirty="0">
+              <a:solidFill>
+                <a:schemeClr val="tx1"/>
+              </a:solidFill>
+            </a:endParaRPr>
+          </a:p>
+        </p:txBody>
+      </p:sp>
+      <p:sp>
+        <p:nvSpPr>
+          <p:cNvPr id="67" name="Rectangle 66"/>
+          <p:cNvSpPr/>
+          <p:nvPr/>
+        </p:nvSpPr>
+        <p:spPr>
+          <a:xfrm>
+            <a:off x="6327058" y="5545887"/>
+            <a:ext cx="828212" cy="768227"/>
+          </a:xfrm>
+          <a:prstGeom prst="rect">
+            <a:avLst/>
+          </a:prstGeom>
+          <a:solidFill>
+            <a:srgbClr val="CFE7F1"/>
+          </a:solidFill>
+          <a:ln w="19050">
+            <a:noFill/>
+          </a:ln>
+        </p:spPr>
+        <p:style>
+          <a:lnRef idx="2">
+            <a:schemeClr val="accent1">
+              <a:shade val="50000"/>
+            </a:schemeClr>
+          </a:lnRef>
+          <a:fillRef idx="1">
+            <a:schemeClr val="accent1"/>
+          </a:fillRef>
+          <a:effectRef idx="0">
+            <a:schemeClr val="accent1"/>
+          </a:effectRef>
+          <a:fontRef idx="minor">
+            <a:schemeClr val="lt1"/>
+          </a:fontRef>
+        </p:style>
+        <p:txBody>
+          <a:bodyPr rtlCol="0" anchor="ctr"/>
+          <a:lstStyle/>
+          <a:p>
+            <a:pPr algn="ctr"/>
+            <a:endParaRPr lang="en-US" sz="2800" dirty="0">
+              <a:solidFill>
+                <a:schemeClr val="tx1"/>
+              </a:solidFill>
+            </a:endParaRPr>
+          </a:p>
+        </p:txBody>
+      </p:sp>
+      <p:sp>
+        <p:nvSpPr>
+          <p:cNvPr id="68" name="Rectangle 67"/>
+          <p:cNvSpPr/>
+          <p:nvPr/>
+        </p:nvSpPr>
+        <p:spPr>
+          <a:xfrm>
+            <a:off x="7424518" y="5545886"/>
+            <a:ext cx="828212" cy="768227"/>
+          </a:xfrm>
+          <a:prstGeom prst="rect">
+            <a:avLst/>
+          </a:prstGeom>
+          <a:solidFill>
+            <a:srgbClr val="CFE7F1"/>
+          </a:solidFill>
+          <a:ln w="19050">
+            <a:noFill/>
+          </a:ln>
+        </p:spPr>
+        <p:style>
+          <a:lnRef idx="2">
+            <a:schemeClr val="accent1">
+              <a:shade val="50000"/>
+            </a:schemeClr>
+          </a:lnRef>
+          <a:fillRef idx="1">
+            <a:schemeClr val="accent1"/>
+          </a:fillRef>
+          <a:effectRef idx="0">
+            <a:schemeClr val="accent1"/>
+          </a:effectRef>
+          <a:fontRef idx="minor">
+            <a:schemeClr val="lt1"/>
+          </a:fontRef>
+        </p:style>
+        <p:txBody>
+          <a:bodyPr rtlCol="0" anchor="ctr"/>
+          <a:lstStyle/>
+          <a:p>
+            <a:pPr algn="ctr"/>
+            <a:endParaRPr lang="en-US" sz="2800" dirty="0">
+              <a:solidFill>
+                <a:schemeClr val="tx1"/>
+              </a:solidFill>
+            </a:endParaRPr>
+          </a:p>
+        </p:txBody>
+      </p:sp>
+      <p:sp>
+        <p:nvSpPr>
+          <p:cNvPr id="69" name="Rectangle 68"/>
+          <p:cNvSpPr/>
+          <p:nvPr/>
+        </p:nvSpPr>
+        <p:spPr>
+          <a:xfrm>
+            <a:off x="3191996" y="5517535"/>
+            <a:ext cx="117709" cy="768227"/>
+          </a:xfrm>
+          <a:prstGeom prst="rect">
+            <a:avLst/>
+          </a:prstGeom>
+          <a:solidFill>
+            <a:srgbClr val="00B0F0"/>
+          </a:solidFill>
+          <a:ln w="19050">
+            <a:noFill/>
+          </a:ln>
+        </p:spPr>
+        <p:style>
+          <a:lnRef idx="2">
+            <a:schemeClr val="accent1">
+              <a:shade val="50000"/>
+            </a:schemeClr>
+          </a:lnRef>
+          <a:fillRef idx="1">
+            <a:schemeClr val="accent1"/>
+          </a:fillRef>
+          <a:effectRef idx="0">
+            <a:schemeClr val="accent1"/>
+          </a:effectRef>
+          <a:fontRef idx="minor">
+            <a:schemeClr val="lt1"/>
+          </a:fontRef>
+        </p:style>
+        <p:txBody>
+          <a:bodyPr rtlCol="0" anchor="ctr"/>
+          <a:lstStyle/>
+          <a:p>
+            <a:pPr algn="ctr"/>
+            <a:endParaRPr lang="en-US" sz="2800" dirty="0">
+              <a:solidFill>
+                <a:schemeClr val="tx1"/>
+              </a:solidFill>
+            </a:endParaRPr>
+          </a:p>
+        </p:txBody>
+      </p:sp>
+      <p:sp>
+        <p:nvSpPr>
+          <p:cNvPr id="70" name="Rectangle 69"/>
+          <p:cNvSpPr/>
+          <p:nvPr/>
+        </p:nvSpPr>
+        <p:spPr>
+          <a:xfrm>
+            <a:off x="3421473" y="5517535"/>
+            <a:ext cx="117709" cy="768227"/>
+          </a:xfrm>
+          <a:prstGeom prst="rect">
+            <a:avLst/>
+          </a:prstGeom>
+          <a:solidFill>
+            <a:srgbClr val="00B0F0"/>
+          </a:solidFill>
+          <a:ln w="19050">
+            <a:noFill/>
+          </a:ln>
+        </p:spPr>
+        <p:style>
+          <a:lnRef idx="2">
+            <a:schemeClr val="accent1">
+              <a:shade val="50000"/>
+            </a:schemeClr>
+          </a:lnRef>
+          <a:fillRef idx="1">
+            <a:schemeClr val="accent1"/>
+          </a:fillRef>
+          <a:effectRef idx="0">
+            <a:schemeClr val="accent1"/>
+          </a:effectRef>
+          <a:fontRef idx="minor">
+            <a:schemeClr val="lt1"/>
+          </a:fontRef>
+        </p:style>
+        <p:txBody>
+          <a:bodyPr rtlCol="0" anchor="ctr"/>
+          <a:lstStyle/>
+          <a:p>
+            <a:pPr algn="ctr"/>
+            <a:endParaRPr lang="en-US" sz="2800" dirty="0">
+              <a:solidFill>
+                <a:schemeClr val="tx1"/>
+              </a:solidFill>
+            </a:endParaRPr>
+          </a:p>
+        </p:txBody>
+      </p:sp>
+      <p:sp>
+        <p:nvSpPr>
+          <p:cNvPr id="71" name="Rectangle 70"/>
+          <p:cNvSpPr/>
+          <p:nvPr/>
+        </p:nvSpPr>
+        <p:spPr>
+          <a:xfrm>
+            <a:off x="4558704" y="5545886"/>
+            <a:ext cx="117709" cy="768227"/>
+          </a:xfrm>
+          <a:prstGeom prst="rect">
+            <a:avLst/>
+          </a:prstGeom>
+          <a:solidFill>
+            <a:srgbClr val="00B0F0"/>
+          </a:solidFill>
+          <a:ln w="19050">
+            <a:noFill/>
+          </a:ln>
+        </p:spPr>
+        <p:style>
+          <a:lnRef idx="2">
+            <a:schemeClr val="accent1">
+              <a:shade val="50000"/>
+            </a:schemeClr>
+          </a:lnRef>
+          <a:fillRef idx="1">
+            <a:schemeClr val="accent1"/>
+          </a:fillRef>
+          <a:effectRef idx="0">
+            <a:schemeClr val="accent1"/>
+          </a:effectRef>
+          <a:fontRef idx="minor">
+            <a:schemeClr val="lt1"/>
+          </a:fontRef>
+        </p:style>
+        <p:txBody>
+          <a:bodyPr rtlCol="0" anchor="ctr"/>
+          <a:lstStyle/>
+          <a:p>
+            <a:pPr algn="ctr"/>
+            <a:endParaRPr lang="en-US" sz="2800" dirty="0">
+              <a:solidFill>
+                <a:schemeClr val="tx1"/>
+              </a:solidFill>
+            </a:endParaRPr>
+          </a:p>
+        </p:txBody>
+      </p:sp>
+      <p:sp>
+        <p:nvSpPr>
+          <p:cNvPr id="72" name="Rectangle 71"/>
+          <p:cNvSpPr/>
+          <p:nvPr/>
+        </p:nvSpPr>
+        <p:spPr>
+          <a:xfrm>
+            <a:off x="6529177" y="5547033"/>
+            <a:ext cx="117709" cy="768227"/>
+          </a:xfrm>
+          <a:prstGeom prst="rect">
+            <a:avLst/>
+          </a:prstGeom>
+          <a:solidFill>
+            <a:srgbClr val="00B0F0"/>
+          </a:solidFill>
+          <a:ln w="19050">
+            <a:noFill/>
+          </a:ln>
+        </p:spPr>
+        <p:style>
+          <a:lnRef idx="2">
+            <a:schemeClr val="accent1">
+              <a:shade val="50000"/>
+            </a:schemeClr>
+          </a:lnRef>
+          <a:fillRef idx="1">
+            <a:schemeClr val="accent1"/>
+          </a:fillRef>
+          <a:effectRef idx="0">
+            <a:schemeClr val="accent1"/>
+          </a:effectRef>
+          <a:fontRef idx="minor">
+            <a:schemeClr val="lt1"/>
+          </a:fontRef>
+        </p:style>
+        <p:txBody>
+          <a:bodyPr rtlCol="0" anchor="ctr"/>
+          <a:lstStyle/>
+          <a:p>
+            <a:pPr algn="ctr"/>
+            <a:endParaRPr lang="en-US" sz="2800" dirty="0">
+              <a:solidFill>
+                <a:schemeClr val="tx1"/>
+              </a:solidFill>
+            </a:endParaRPr>
+          </a:p>
+        </p:txBody>
+      </p:sp>
+      <p:sp>
+        <p:nvSpPr>
+          <p:cNvPr id="73" name="Rectangle 72"/>
+          <p:cNvSpPr/>
+          <p:nvPr/>
+        </p:nvSpPr>
+        <p:spPr>
+          <a:xfrm>
+            <a:off x="6724514" y="5545886"/>
+            <a:ext cx="117709" cy="768227"/>
+          </a:xfrm>
+          <a:prstGeom prst="rect">
+            <a:avLst/>
+          </a:prstGeom>
+          <a:solidFill>
+            <a:srgbClr val="00B0F0"/>
+          </a:solidFill>
+          <a:ln w="19050">
+            <a:noFill/>
+          </a:ln>
+        </p:spPr>
+        <p:style>
+          <a:lnRef idx="2">
+            <a:schemeClr val="accent1">
+              <a:shade val="50000"/>
+            </a:schemeClr>
+          </a:lnRef>
+          <a:fillRef idx="1">
+            <a:schemeClr val="accent1"/>
+          </a:fillRef>
+          <a:effectRef idx="0">
+            <a:schemeClr val="accent1"/>
+          </a:effectRef>
+          <a:fontRef idx="minor">
+            <a:schemeClr val="lt1"/>
+          </a:fontRef>
+        </p:style>
+        <p:txBody>
+          <a:bodyPr rtlCol="0" anchor="ctr"/>
+          <a:lstStyle/>
+          <a:p>
+            <a:pPr algn="ctr"/>
+            <a:endParaRPr lang="en-US" sz="2800" dirty="0">
+              <a:solidFill>
+                <a:schemeClr val="tx1"/>
+              </a:solidFill>
+            </a:endParaRPr>
+          </a:p>
+        </p:txBody>
+      </p:sp>
+      <p:sp>
+        <p:nvSpPr>
+          <p:cNvPr id="74" name="Rectangle 73"/>
+          <p:cNvSpPr/>
+          <p:nvPr/>
+        </p:nvSpPr>
+        <p:spPr>
+          <a:xfrm>
+            <a:off x="6910396" y="5545886"/>
+            <a:ext cx="117709" cy="768227"/>
+          </a:xfrm>
+          <a:prstGeom prst="rect">
+            <a:avLst/>
+          </a:prstGeom>
+          <a:solidFill>
+            <a:srgbClr val="00B0F0"/>
+          </a:solidFill>
+          <a:ln w="19050">
+            <a:noFill/>
+          </a:ln>
+        </p:spPr>
+        <p:style>
+          <a:lnRef idx="2">
+            <a:schemeClr val="accent1">
+              <a:shade val="50000"/>
+            </a:schemeClr>
+          </a:lnRef>
+          <a:fillRef idx="1">
+            <a:schemeClr val="accent1"/>
+          </a:fillRef>
+          <a:effectRef idx="0">
+            <a:schemeClr val="accent1"/>
+          </a:effectRef>
+          <a:fontRef idx="minor">
+            <a:schemeClr val="lt1"/>
+          </a:fontRef>
+        </p:style>
+        <p:txBody>
+          <a:bodyPr rtlCol="0" anchor="ctr"/>
+          <a:lstStyle/>
+          <a:p>
+            <a:pPr algn="ctr"/>
+            <a:endParaRPr lang="en-US" sz="2800" dirty="0">
+              <a:solidFill>
+                <a:schemeClr val="tx1"/>
+              </a:solidFill>
+            </a:endParaRPr>
+          </a:p>
+        </p:txBody>
+      </p:sp>
+      <p:sp>
+        <p:nvSpPr>
+          <p:cNvPr id="75" name="Rectangle 74"/>
+          <p:cNvSpPr/>
+          <p:nvPr/>
+        </p:nvSpPr>
+        <p:spPr>
+          <a:xfrm>
+            <a:off x="7704265" y="5548179"/>
+            <a:ext cx="117709" cy="768227"/>
+          </a:xfrm>
+          <a:prstGeom prst="rect">
+            <a:avLst/>
+          </a:prstGeom>
+          <a:solidFill>
+            <a:srgbClr val="00B0F0"/>
+          </a:solidFill>
+          <a:ln w="19050">
+            <a:noFill/>
+          </a:ln>
+        </p:spPr>
+        <p:style>
+          <a:lnRef idx="2">
+            <a:schemeClr val="accent1">
+              <a:shade val="50000"/>
+            </a:schemeClr>
+          </a:lnRef>
+          <a:fillRef idx="1">
+            <a:schemeClr val="accent1"/>
+          </a:fillRef>
+          <a:effectRef idx="0">
+            <a:schemeClr val="accent1"/>
+          </a:effectRef>
+          <a:fontRef idx="minor">
+            <a:schemeClr val="lt1"/>
+          </a:fontRef>
+        </p:style>
+        <p:txBody>
+          <a:bodyPr rtlCol="0" anchor="ctr"/>
+          <a:lstStyle/>
+          <a:p>
+            <a:pPr algn="ctr"/>
+            <a:endParaRPr lang="en-US" sz="2800" dirty="0">
+              <a:solidFill>
+                <a:schemeClr val="tx1"/>
+              </a:solidFill>
+            </a:endParaRPr>
+          </a:p>
+        </p:txBody>
+      </p:sp>
+      <p:sp>
+        <p:nvSpPr>
+          <p:cNvPr id="76" name="TextBox 75"/>
+          <p:cNvSpPr txBox="1"/>
+          <p:nvPr/>
+        </p:nvSpPr>
+        <p:spPr>
+          <a:xfrm>
+            <a:off x="4245865" y="6354654"/>
+            <a:ext cx="2255874" cy="400110"/>
+          </a:xfrm>
+          <a:prstGeom prst="rect">
+            <a:avLst/>
+          </a:prstGeom>
+          <a:noFill/>
+        </p:spPr>
+        <p:txBody>
+          <a:bodyPr wrap="none" rtlCol="0">
+            <a:spAutoFit/>
+          </a:bodyPr>
+          <a:lstStyle/>
+          <a:p>
+            <a:r>
+              <a:rPr lang="en-US" dirty="0" smtClean="0"/>
+              <a:t>Bloc</a:t>
+            </a:r>
+            <a:r>
+              <a:rPr lang="en-US" sz="2000" dirty="0" smtClean="0"/>
+              <a:t>kstack Log Entry</a:t>
+            </a:r>
+            <a:endParaRPr lang="en-US" sz="2000" dirty="0"/>
+          </a:p>
+        </p:txBody>
+      </p:sp>
+      <p:cxnSp>
+        <p:nvCxnSpPr>
+          <p:cNvPr id="77" name="Straight Arrow Connector 76"/>
+          <p:cNvCxnSpPr>
+            <a:stCxn id="51" idx="3"/>
+          </p:cNvCxnSpPr>
+          <p:nvPr/>
+        </p:nvCxnSpPr>
+        <p:spPr>
+          <a:xfrm flipV="1">
+            <a:off x="6501739" y="6314114"/>
+            <a:ext cx="239425" cy="240595"/>
+          </a:xfrm>
+          <a:prstGeom prst="straightConnector1">
+            <a:avLst/>
+          </a:prstGeom>
+          <a:ln>
+            <a:solidFill>
+              <a:schemeClr val="tx1"/>
+            </a:solidFill>
+            <a:tailEnd type="triangle"/>
+          </a:ln>
+        </p:spPr>
+        <p:style>
+          <a:lnRef idx="1">
+            <a:schemeClr val="accent1"/>
+          </a:lnRef>
+          <a:fillRef idx="0">
+            <a:schemeClr val="accent1"/>
+          </a:fillRef>
+          <a:effectRef idx="0">
+            <a:schemeClr val="accent1"/>
+          </a:effectRef>
+          <a:fontRef idx="minor">
+            <a:schemeClr val="tx1"/>
+          </a:fontRef>
+        </p:style>
+      </p:cxnSp>
+      <p:sp>
+        <p:nvSpPr>
+          <p:cNvPr id="78" name="TextBox 77"/>
+          <p:cNvSpPr txBox="1"/>
+          <p:nvPr/>
+        </p:nvSpPr>
+        <p:spPr>
+          <a:xfrm>
+            <a:off x="1673247" y="5039987"/>
+            <a:ext cx="1299266" cy="400110"/>
+          </a:xfrm>
+          <a:prstGeom prst="rect">
+            <a:avLst/>
+          </a:prstGeom>
+          <a:noFill/>
+        </p:spPr>
+        <p:txBody>
+          <a:bodyPr wrap="none" rtlCol="0">
+            <a:spAutoFit/>
+          </a:bodyPr>
+          <a:lstStyle/>
+          <a:p>
+            <a:r>
+              <a:rPr lang="en-US" sz="2000" dirty="0" err="1" smtClean="0"/>
+              <a:t>Blockchain</a:t>
+            </a:r>
+            <a:endParaRPr lang="en-US" sz="2000" dirty="0"/>
+          </a:p>
+        </p:txBody>
+      </p:sp>
+      <p:sp>
+        <p:nvSpPr>
+          <p:cNvPr id="79" name="Cloud 78"/>
+          <p:cNvSpPr/>
+          <p:nvPr/>
+        </p:nvSpPr>
+        <p:spPr>
+          <a:xfrm>
+            <a:off x="4417142" y="545690"/>
+            <a:ext cx="3819832" cy="2050026"/>
+          </a:xfrm>
+          <a:prstGeom prst="cloud">
+            <a:avLst/>
+          </a:prstGeom>
+          <a:ln w="28575"/>
+        </p:spPr>
+        <p:style>
+          <a:lnRef idx="2">
+            <a:schemeClr val="accent1"/>
+          </a:lnRef>
+          <a:fillRef idx="1">
+            <a:schemeClr val="lt1"/>
+          </a:fillRef>
+          <a:effectRef idx="0">
+            <a:schemeClr val="accent1"/>
+          </a:effectRef>
+          <a:fontRef idx="minor">
+            <a:schemeClr val="dk1"/>
+          </a:fontRef>
+        </p:style>
+        <p:txBody>
+          <a:bodyPr rtlCol="0" anchor="ctr"/>
+          <a:lstStyle/>
+          <a:p>
+            <a:pPr algn="ctr"/>
+            <a:endParaRPr lang="en-US"/>
+          </a:p>
+        </p:txBody>
+      </p:sp>
+      <p:sp>
+        <p:nvSpPr>
+          <p:cNvPr id="80" name="Rectangular Callout 79"/>
+          <p:cNvSpPr/>
+          <p:nvPr/>
+        </p:nvSpPr>
+        <p:spPr>
+          <a:xfrm>
+            <a:off x="5771183" y="1147247"/>
+            <a:ext cx="961455" cy="574287"/>
+          </a:xfrm>
+          <a:prstGeom prst="wedgeRectCallout">
+            <a:avLst>
+              <a:gd name="adj1" fmla="val 41161"/>
+              <a:gd name="adj2" fmla="val 80449"/>
+            </a:avLst>
+          </a:prstGeom>
+          <a:solidFill>
+            <a:schemeClr val="accent1">
+              <a:lumMod val="40000"/>
+              <a:lumOff val="60000"/>
+            </a:schemeClr>
+          </a:solidFill>
+        </p:spPr>
+        <p:style>
+          <a:lnRef idx="2">
+            <a:schemeClr val="accent1">
+              <a:shade val="50000"/>
+            </a:schemeClr>
+          </a:lnRef>
+          <a:fillRef idx="1">
+            <a:schemeClr val="accent1"/>
+          </a:fillRef>
+          <a:effectRef idx="0">
+            <a:schemeClr val="accent1"/>
+          </a:effectRef>
+          <a:fontRef idx="minor">
+            <a:schemeClr val="lt1"/>
+          </a:fontRef>
+        </p:style>
+        <p:txBody>
+          <a:bodyPr rtlCol="0" anchor="ctr"/>
+          <a:lstStyle/>
+          <a:p>
+            <a:pPr algn="ctr"/>
+            <a:r>
+              <a:rPr lang="en-US" dirty="0" smtClean="0">
+                <a:solidFill>
+                  <a:schemeClr val="tx1"/>
+                </a:solidFill>
+              </a:rPr>
+              <a:t>Identity</a:t>
+            </a:r>
+          </a:p>
+          <a:p>
+            <a:pPr algn="ctr"/>
+            <a:r>
+              <a:rPr lang="en-US" dirty="0" smtClean="0">
+                <a:solidFill>
+                  <a:schemeClr val="tx1"/>
+                </a:solidFill>
+              </a:rPr>
+              <a:t>Data</a:t>
+            </a:r>
+            <a:endParaRPr lang="en-US" dirty="0">
+              <a:solidFill>
+                <a:schemeClr val="tx1"/>
+              </a:solidFill>
+            </a:endParaRPr>
+          </a:p>
+        </p:txBody>
+      </p:sp>
+      <p:sp>
+        <p:nvSpPr>
+          <p:cNvPr id="81" name="TextBox 80"/>
+          <p:cNvSpPr txBox="1"/>
+          <p:nvPr/>
+        </p:nvSpPr>
+        <p:spPr>
+          <a:xfrm>
+            <a:off x="6586112" y="1720484"/>
+            <a:ext cx="835934" cy="369332"/>
+          </a:xfrm>
+          <a:prstGeom prst="rect">
+            <a:avLst/>
+          </a:prstGeom>
+          <a:noFill/>
+        </p:spPr>
+        <p:txBody>
+          <a:bodyPr wrap="none" rtlCol="0">
+            <a:spAutoFit/>
+          </a:bodyPr>
+          <a:lstStyle/>
+          <a:p>
+            <a:r>
+              <a:rPr lang="en-US" dirty="0" smtClean="0"/>
+              <a:t>Private</a:t>
+            </a:r>
+            <a:endParaRPr lang="en-US" dirty="0"/>
+          </a:p>
+        </p:txBody>
+      </p:sp>
+      <p:cxnSp>
+        <p:nvCxnSpPr>
+          <p:cNvPr id="82" name="Straight Arrow Connector 81"/>
+          <p:cNvCxnSpPr>
+            <a:endCxn id="45" idx="2"/>
+          </p:cNvCxnSpPr>
+          <p:nvPr/>
+        </p:nvCxnSpPr>
+        <p:spPr>
+          <a:xfrm>
+            <a:off x="2031549" y="1997299"/>
+            <a:ext cx="2960558" cy="1970859"/>
+          </a:xfrm>
+          <a:prstGeom prst="straightConnector1">
+            <a:avLst/>
+          </a:prstGeom>
+          <a:ln>
+            <a:tailEnd type="triangle"/>
+          </a:ln>
+        </p:spPr>
+        <p:style>
+          <a:lnRef idx="2">
+            <a:schemeClr val="dk1"/>
+          </a:lnRef>
+          <a:fillRef idx="0">
+            <a:schemeClr val="dk1"/>
+          </a:fillRef>
+          <a:effectRef idx="1">
+            <a:schemeClr val="dk1"/>
+          </a:effectRef>
+          <a:fontRef idx="minor">
+            <a:schemeClr val="tx1"/>
+          </a:fontRef>
+        </p:style>
+      </p:cxnSp>
+      <p:sp>
+        <p:nvSpPr>
+          <p:cNvPr id="83" name="TextBox 82"/>
+          <p:cNvSpPr txBox="1"/>
+          <p:nvPr/>
+        </p:nvSpPr>
+        <p:spPr>
+          <a:xfrm>
+            <a:off x="1671399" y="3252565"/>
+            <a:ext cx="2726452" cy="923330"/>
+          </a:xfrm>
+          <a:prstGeom prst="rect">
+            <a:avLst/>
+          </a:prstGeom>
+          <a:noFill/>
+        </p:spPr>
+        <p:txBody>
+          <a:bodyPr wrap="none" rtlCol="0">
+            <a:spAutoFit/>
+          </a:bodyPr>
+          <a:lstStyle/>
+          <a:p>
+            <a:pPr marL="342900" indent="-342900">
+              <a:buAutoNum type="arabicParenBoth"/>
+            </a:pPr>
+            <a:r>
+              <a:rPr lang="en-US" dirty="0" smtClean="0"/>
+              <a:t>Query DB with Name</a:t>
+            </a:r>
+          </a:p>
+          <a:p>
+            <a:r>
+              <a:rPr lang="en-US" dirty="0"/>
+              <a:t> </a:t>
+            </a:r>
+            <a:r>
+              <a:rPr lang="en-US" dirty="0" smtClean="0"/>
+              <a:t>      and get Public Key and</a:t>
+            </a:r>
+          </a:p>
+          <a:p>
+            <a:r>
+              <a:rPr lang="en-US" dirty="0"/>
+              <a:t> </a:t>
+            </a:r>
+            <a:r>
+              <a:rPr lang="en-US" dirty="0" smtClean="0"/>
+              <a:t>      Route in return.</a:t>
+            </a:r>
+            <a:endParaRPr lang="en-US" dirty="0"/>
+          </a:p>
+        </p:txBody>
+      </p:sp>
+      <p:cxnSp>
+        <p:nvCxnSpPr>
+          <p:cNvPr id="84" name="Straight Arrow Connector 83"/>
+          <p:cNvCxnSpPr>
+            <a:endCxn id="59" idx="2"/>
+          </p:cNvCxnSpPr>
+          <p:nvPr/>
+        </p:nvCxnSpPr>
+        <p:spPr>
+          <a:xfrm flipV="1">
+            <a:off x="2631268" y="1570703"/>
+            <a:ext cx="1797723" cy="3141"/>
+          </a:xfrm>
+          <a:prstGeom prst="straightConnector1">
+            <a:avLst/>
+          </a:prstGeom>
+          <a:ln>
+            <a:tailEnd type="triangle"/>
+          </a:ln>
+        </p:spPr>
+        <p:style>
+          <a:lnRef idx="2">
+            <a:schemeClr val="dk1"/>
+          </a:lnRef>
+          <a:fillRef idx="0">
+            <a:schemeClr val="dk1"/>
+          </a:fillRef>
+          <a:effectRef idx="1">
+            <a:schemeClr val="dk1"/>
+          </a:effectRef>
+          <a:fontRef idx="minor">
+            <a:schemeClr val="tx1"/>
+          </a:fontRef>
+        </p:style>
+      </p:cxnSp>
+      <p:sp>
+        <p:nvSpPr>
+          <p:cNvPr id="85" name="TextBox 84"/>
+          <p:cNvSpPr txBox="1"/>
+          <p:nvPr/>
+        </p:nvSpPr>
+        <p:spPr>
+          <a:xfrm>
+            <a:off x="1748644" y="558844"/>
+            <a:ext cx="3145989" cy="646331"/>
+          </a:xfrm>
+          <a:prstGeom prst="rect">
+            <a:avLst/>
+          </a:prstGeom>
+          <a:noFill/>
+        </p:spPr>
+        <p:txBody>
+          <a:bodyPr wrap="none" rtlCol="0">
+            <a:spAutoFit/>
+          </a:bodyPr>
+          <a:lstStyle/>
+          <a:p>
+            <a:r>
+              <a:rPr lang="en-US" dirty="0" smtClean="0"/>
+              <a:t>(2) Query Route URL for Id Data</a:t>
+            </a:r>
+          </a:p>
+          <a:p>
+            <a:r>
+              <a:rPr lang="en-US" dirty="0"/>
+              <a:t> </a:t>
+            </a:r>
+            <a:r>
+              <a:rPr lang="en-US" dirty="0" smtClean="0"/>
+              <a:t>     and verify with Public Key.</a:t>
+            </a:r>
+            <a:endParaRPr lang="en-US" dirty="0"/>
+          </a:p>
+        </p:txBody>
+      </p:sp>
+    </p:spTree>
+    <p:extLst>
+      <p:ext uri="{BB962C8B-B14F-4D97-AF65-F5344CB8AC3E}">
+        <p14:creationId xmlns:p14="http://schemas.microsoft.com/office/powerpoint/2010/main" val="1324667156"/>
+      </p:ext>
+    </p:extLst>
+  </p:cSld>
+  <p:clrMapOvr>
+    <a:masterClrMapping/>
+  </p:clrMapOvr>
+  <p:timing>
+    <p:tnLst>
+      <p:par>
+        <p:cTn id="1" dur="indefinite" restart="never" nodeType="tmRoot"/>
+      </p:par>
+    </p:tnLst>
+  </p:timing>
+</p:sld>
+</file>
+
 <file path=ppt/theme/theme1.xml><?xml version="1.0" encoding="utf-8"?>
 <a:theme xmlns:a="http://schemas.openxmlformats.org/drawingml/2006/main" name="Office Theme">
   <a:themeElements>
@@ -5885,4 +9611,265 @@
     </a:ext>
   </a:extLst>
 </a:theme>
+</file>
+
+<file path=ppt/theme/theme2.xml><?xml version="1.0" encoding="utf-8"?>
+<a:theme xmlns:a="http://schemas.openxmlformats.org/drawingml/2006/main" name="Office Theme">
+  <a:themeElements>
+    <a:clrScheme name="Office">
+      <a:dk1>
+        <a:sysClr val="windowText" lastClr="000000"/>
+      </a:dk1>
+      <a:lt1>
+        <a:sysClr val="window" lastClr="FFFFFF"/>
+      </a:lt1>
+      <a:dk2>
+        <a:srgbClr val="44546A"/>
+      </a:dk2>
+      <a:lt2>
+        <a:srgbClr val="E7E6E6"/>
+      </a:lt2>
+      <a:accent1>
+        <a:srgbClr val="5B9BD5"/>
+      </a:accent1>
+      <a:accent2>
+        <a:srgbClr val="ED7D31"/>
+      </a:accent2>
+      <a:accent3>
+        <a:srgbClr val="A5A5A5"/>
+      </a:accent3>
+      <a:accent4>
+        <a:srgbClr val="FFC000"/>
+      </a:accent4>
+      <a:accent5>
+        <a:srgbClr val="4472C4"/>
+      </a:accent5>
+      <a:accent6>
+        <a:srgbClr val="70AD47"/>
+      </a:accent6>
+      <a:hlink>
+        <a:srgbClr val="0563C1"/>
+      </a:hlink>
+      <a:folHlink>
+        <a:srgbClr val="954F72"/>
+      </a:folHlink>
+    </a:clrScheme>
+    <a:fontScheme name="Office">
+      <a:majorFont>
+        <a:latin typeface="Calibri Light" panose="020F0302020204030204"/>
+        <a:ea typeface=""/>
+        <a:cs typeface=""/>
+        <a:font script="Jpan" typeface="ＭＳ Ｐゴシック"/>
+        <a:font script="Hang" typeface="맑은 고딕"/>
+        <a:font script="Hans" typeface="宋体"/>
+        <a:font script="Hant" typeface="新細明體"/>
+        <a:font script="Arab" typeface="Times New Roman"/>
+        <a:font script="Hebr" typeface="Times New Roman"/>
+        <a:font script="Thai" typeface="Angsana New"/>
+        <a:font script="Ethi" typeface="Nyala"/>
+        <a:font script="Beng" typeface="Vrinda"/>
+        <a:font script="Gujr" typeface="Shruti"/>
+        <a:font script="Khmr" typeface="MoolBoran"/>
+        <a:font script="Knda" typeface="Tunga"/>
+        <a:font script="Guru" typeface="Raavi"/>
+        <a:font script="Cans" typeface="Euphemia"/>
+        <a:font script="Cher" typeface="Plantagenet Cherokee"/>
+        <a:font script="Yiii" typeface="Microsoft Yi Baiti"/>
+        <a:font script="Tibt" typeface="Microsoft Himalaya"/>
+        <a:font script="Thaa" typeface="MV Boli"/>
+        <a:font script="Deva" typeface="Mangal"/>
+        <a:font script="Telu" typeface="Gautami"/>
+        <a:font script="Taml" typeface="Latha"/>
+        <a:font script="Syrc" typeface="Estrangelo Edessa"/>
+        <a:font script="Orya" typeface="Kalinga"/>
+        <a:font script="Mlym" typeface="Kartika"/>
+        <a:font script="Laoo" typeface="DokChampa"/>
+        <a:font script="Sinh" typeface="Iskoola Pota"/>
+        <a:font script="Mong" typeface="Mongolian Baiti"/>
+        <a:font script="Viet" typeface="Times New Roman"/>
+        <a:font script="Uigh" typeface="Microsoft Uighur"/>
+        <a:font script="Geor" typeface="Sylfaen"/>
+      </a:majorFont>
+      <a:minorFont>
+        <a:latin typeface="Calibri" panose="020F0502020204030204"/>
+        <a:ea typeface=""/>
+        <a:cs typeface=""/>
+        <a:font script="Jpan" typeface="ＭＳ Ｐゴシック"/>
+        <a:font script="Hang" typeface="맑은 고딕"/>
+        <a:font script="Hans" typeface="宋体"/>
+        <a:font script="Hant" typeface="新細明體"/>
+        <a:font script="Arab" typeface="Arial"/>
+        <a:font script="Hebr" typeface="Arial"/>
+        <a:font script="Thai" typeface="Cordia New"/>
+        <a:font script="Ethi" typeface="Nyala"/>
+        <a:font script="Beng" typeface="Vrinda"/>
+        <a:font script="Gujr" typeface="Shruti"/>
+        <a:font script="Khmr" typeface="DaunPenh"/>
+        <a:font script="Knda" typeface="Tunga"/>
+        <a:font script="Guru" typeface="Raavi"/>
+        <a:font script="Cans" typeface="Euphemia"/>
+        <a:font script="Cher" typeface="Plantagenet Cherokee"/>
+        <a:font script="Yiii" typeface="Microsoft Yi Baiti"/>
+        <a:font script="Tibt" typeface="Microsoft Himalaya"/>
+        <a:font script="Thaa" typeface="MV Boli"/>
+        <a:font script="Deva" typeface="Mangal"/>
+        <a:font script="Telu" typeface="Gautami"/>
+        <a:font script="Taml" typeface="Latha"/>
+        <a:font script="Syrc" typeface="Estrangelo Edessa"/>
+        <a:font script="Orya" typeface="Kalinga"/>
+        <a:font script="Mlym" typeface="Kartika"/>
+        <a:font script="Laoo" typeface="DokChampa"/>
+        <a:font script="Sinh" typeface="Iskoola Pota"/>
+        <a:font script="Mong" typeface="Mongolian Baiti"/>
+        <a:font script="Viet" typeface="Arial"/>
+        <a:font script="Uigh" typeface="Microsoft Uighur"/>
+        <a:font script="Geor" typeface="Sylfaen"/>
+      </a:minorFont>
+    </a:fontScheme>
+    <a:fmtScheme name="Office">
+      <a:fillStyleLst>
+        <a:solidFill>
+          <a:schemeClr val="phClr"/>
+        </a:solidFill>
+        <a:gradFill rotWithShape="1">
+          <a:gsLst>
+            <a:gs pos="0">
+              <a:schemeClr val="phClr">
+                <a:lumMod val="110000"/>
+                <a:satMod val="105000"/>
+                <a:tint val="67000"/>
+              </a:schemeClr>
+            </a:gs>
+            <a:gs pos="50000">
+              <a:schemeClr val="phClr">
+                <a:lumMod val="105000"/>
+                <a:satMod val="103000"/>
+                <a:tint val="73000"/>
+              </a:schemeClr>
+            </a:gs>
+            <a:gs pos="100000">
+              <a:schemeClr val="phClr">
+                <a:lumMod val="105000"/>
+                <a:satMod val="109000"/>
+                <a:tint val="81000"/>
+              </a:schemeClr>
+            </a:gs>
+          </a:gsLst>
+          <a:lin ang="5400000" scaled="0"/>
+        </a:gradFill>
+        <a:gradFill rotWithShape="1">
+          <a:gsLst>
+            <a:gs pos="0">
+              <a:schemeClr val="phClr">
+                <a:satMod val="103000"/>
+                <a:lumMod val="102000"/>
+                <a:tint val="94000"/>
+              </a:schemeClr>
+            </a:gs>
+            <a:gs pos="50000">
+              <a:schemeClr val="phClr">
+                <a:satMod val="110000"/>
+                <a:lumMod val="100000"/>
+                <a:shade val="100000"/>
+              </a:schemeClr>
+            </a:gs>
+            <a:gs pos="100000">
+              <a:schemeClr val="phClr">
+                <a:lumMod val="99000"/>
+                <a:satMod val="120000"/>
+                <a:shade val="78000"/>
+              </a:schemeClr>
+            </a:gs>
+          </a:gsLst>
+          <a:lin ang="5400000" scaled="0"/>
+        </a:gradFill>
+      </a:fillStyleLst>
+      <a:lnStyleLst>
+        <a:ln w="6350" cap="flat" cmpd="sng" algn="ctr">
+          <a:solidFill>
+            <a:schemeClr val="phClr"/>
+          </a:solidFill>
+          <a:prstDash val="solid"/>
+          <a:miter lim="800000"/>
+        </a:ln>
+        <a:ln w="12700" cap="flat" cmpd="sng" algn="ctr">
+          <a:solidFill>
+            <a:schemeClr val="phClr"/>
+          </a:solidFill>
+          <a:prstDash val="solid"/>
+          <a:miter lim="800000"/>
+        </a:ln>
+        <a:ln w="19050" cap="flat" cmpd="sng" algn="ctr">
+          <a:solidFill>
+            <a:schemeClr val="phClr"/>
+          </a:solidFill>
+          <a:prstDash val="solid"/>
+          <a:miter lim="800000"/>
+        </a:ln>
+      </a:lnStyleLst>
+      <a:effectStyleLst>
+        <a:effectStyle>
+          <a:effectLst/>
+        </a:effectStyle>
+        <a:effectStyle>
+          <a:effectLst/>
+        </a:effectStyle>
+        <a:effectStyle>
+          <a:effectLst>
+            <a:outerShdw blurRad="57150" dist="19050" dir="5400000" algn="ctr" rotWithShape="0">
+              <a:srgbClr val="000000">
+                <a:alpha val="63000"/>
+              </a:srgbClr>
+            </a:outerShdw>
+          </a:effectLst>
+        </a:effectStyle>
+      </a:effectStyleLst>
+      <a:bgFillStyleLst>
+        <a:solidFill>
+          <a:schemeClr val="phClr"/>
+        </a:solidFill>
+        <a:solidFill>
+          <a:schemeClr val="phClr">
+            <a:tint val="95000"/>
+            <a:satMod val="170000"/>
+          </a:schemeClr>
+        </a:solidFill>
+        <a:gradFill rotWithShape="1">
+          <a:gsLst>
+            <a:gs pos="0">
+              <a:schemeClr val="phClr">
+                <a:tint val="93000"/>
+                <a:satMod val="150000"/>
+                <a:shade val="98000"/>
+                <a:lumMod val="102000"/>
+              </a:schemeClr>
+            </a:gs>
+            <a:gs pos="50000">
+              <a:schemeClr val="phClr">
+                <a:tint val="98000"/>
+                <a:satMod val="130000"/>
+                <a:shade val="90000"/>
+                <a:lumMod val="103000"/>
+              </a:schemeClr>
+            </a:gs>
+            <a:gs pos="100000">
+              <a:schemeClr val="phClr">
+                <a:shade val="63000"/>
+                <a:satMod val="120000"/>
+              </a:schemeClr>
+            </a:gs>
+          </a:gsLst>
+          <a:lin ang="5400000" scaled="0"/>
+        </a:gradFill>
+      </a:bgFillStyleLst>
+    </a:fmtScheme>
+  </a:themeElements>
+  <a:objectDefaults/>
+  <a:extraClrSchemeLst/>
+  <a:extLst>
+    <a:ext uri="{05A4C25C-085E-4340-85A3-A5531E510DB2}">
+      <thm15:themeFamily xmlns:thm15="http://schemas.microsoft.com/office/thememl/2012/main" name="Office Theme" id="{62F939B6-93AF-4DB8-9C6B-D6C7DFDC589F}" vid="{4A3C46E8-61CC-4603-A589-7422A47A8E4A}"/>
+    </a:ext>
+  </a:extLst>
+</a:theme>
 </file>
</xml_diff>